<commit_message>
Fix error in slide
</commit_message>
<xml_diff>
--- a/Slide/Slide.pptx
+++ b/Slide/Slide.pptx
@@ -178,7 +178,7 @@
   </p:defaultTextStyle>
   <p:extLst>
     <p:ext uri="{EFAFB233-063F-42B5-8137-9DF3F51BA10A}">
-      <p15:sldGuideLst xmlns:p15="http://schemas.microsoft.com/office/powerpoint/2012/main" xmlns="">
+      <p15:sldGuideLst xmlns:p15="http://schemas.microsoft.com/office/powerpoint/2012/main">
         <p15:guide id="1" orient="horz" pos="2160">
           <p15:clr>
             <a:srgbClr val="A4A3A4"/>
@@ -278,7 +278,7 @@
             <a:fld id="{49582670-1A61-43BE-9EF0-48E8CBC2AE6A}" type="datetimeFigureOut">
               <a:rPr lang="en-US" smtClean="0"/>
               <a:pPr/>
-              <a:t>2015-12-24</a:t>
+              <a:t>12/31/2015</a:t>
             </a:fld>
             <a:endParaRPr lang="en-US"/>
           </a:p>
@@ -449,7 +449,7 @@
     </p:spTree>
     <p:extLst>
       <p:ext uri="{BB962C8B-B14F-4D97-AF65-F5344CB8AC3E}">
-        <p14:creationId xmlns:p14="http://schemas.microsoft.com/office/powerpoint/2010/main" xmlns="" val="3228215013"/>
+        <p14:creationId xmlns:p14="http://schemas.microsoft.com/office/powerpoint/2010/main" val="3228215013"/>
       </p:ext>
     </p:extLst>
   </p:cSld>
@@ -681,7 +681,7 @@
             <a:fld id="{A2BF71FF-778E-4572-8B98-7506B716489E}" type="datetime1">
               <a:rPr lang="en-US" smtClean="0"/>
               <a:pPr/>
-              <a:t>2015-12-24</a:t>
+              <a:t>12/31/2015</a:t>
             </a:fld>
             <a:endParaRPr lang="en-US"/>
           </a:p>
@@ -733,7 +733,7 @@
     </p:spTree>
     <p:extLst>
       <p:ext uri="{BB962C8B-B14F-4D97-AF65-F5344CB8AC3E}">
-        <p14:creationId xmlns:p14="http://schemas.microsoft.com/office/powerpoint/2010/main" xmlns="" val="4260815382"/>
+        <p14:creationId xmlns:p14="http://schemas.microsoft.com/office/powerpoint/2010/main" val="4260815382"/>
       </p:ext>
     </p:extLst>
   </p:cSld>
@@ -853,7 +853,7 @@
             <a:fld id="{C300A583-5ECD-4964-B5FB-23D70A601CFF}" type="datetime1">
               <a:rPr lang="en-US" smtClean="0"/>
               <a:pPr/>
-              <a:t>2015-12-24</a:t>
+              <a:t>12/31/2015</a:t>
             </a:fld>
             <a:endParaRPr lang="en-US"/>
           </a:p>
@@ -905,7 +905,7 @@
     </p:spTree>
     <p:extLst>
       <p:ext uri="{BB962C8B-B14F-4D97-AF65-F5344CB8AC3E}">
-        <p14:creationId xmlns:p14="http://schemas.microsoft.com/office/powerpoint/2010/main" xmlns="" val="246433390"/>
+        <p14:creationId xmlns:p14="http://schemas.microsoft.com/office/powerpoint/2010/main" val="246433390"/>
       </p:ext>
     </p:extLst>
   </p:cSld>
@@ -1035,7 +1035,7 @@
             <a:fld id="{F92A3FF2-91C8-4625-B4F6-246D52FF1D3F}" type="datetime1">
               <a:rPr lang="en-US" smtClean="0"/>
               <a:pPr/>
-              <a:t>2015-12-24</a:t>
+              <a:t>12/31/2015</a:t>
             </a:fld>
             <a:endParaRPr lang="en-US"/>
           </a:p>
@@ -1087,7 +1087,7 @@
     </p:spTree>
     <p:extLst>
       <p:ext uri="{BB962C8B-B14F-4D97-AF65-F5344CB8AC3E}">
-        <p14:creationId xmlns:p14="http://schemas.microsoft.com/office/powerpoint/2010/main" xmlns="" val="1339607870"/>
+        <p14:creationId xmlns:p14="http://schemas.microsoft.com/office/powerpoint/2010/main" val="1339607870"/>
       </p:ext>
     </p:extLst>
   </p:cSld>
@@ -1285,7 +1285,7 @@
                 </a:solidFill>
               </a:rPr>
               <a:pPr/>
-              <a:t>2015-12-24</a:t>
+              <a:t>12/31/2015</a:t>
             </a:fld>
             <a:endParaRPr lang="en-US">
               <a:solidFill>
@@ -1488,7 +1488,7 @@
                 </a:solidFill>
               </a:rPr>
               <a:pPr/>
-              <a:t>2015-12-24</a:t>
+              <a:t>12/31/2015</a:t>
             </a:fld>
             <a:endParaRPr lang="en-US">
               <a:solidFill>
@@ -1765,7 +1765,7 @@
                 </a:solidFill>
               </a:rPr>
               <a:pPr/>
-              <a:t>2015-12-24</a:t>
+              <a:t>12/31/2015</a:t>
             </a:fld>
             <a:endParaRPr lang="en-US">
               <a:solidFill>
@@ -2080,7 +2080,7 @@
                 </a:solidFill>
               </a:rPr>
               <a:pPr/>
-              <a:t>2015-12-24</a:t>
+              <a:t>12/31/2015</a:t>
             </a:fld>
             <a:endParaRPr lang="en-US">
               <a:solidFill>
@@ -2529,7 +2529,7 @@
                 </a:solidFill>
               </a:rPr>
               <a:pPr/>
-              <a:t>2015-12-24</a:t>
+              <a:t>12/31/2015</a:t>
             </a:fld>
             <a:endParaRPr lang="en-US">
               <a:solidFill>
@@ -2674,7 +2674,7 @@
                 </a:solidFill>
               </a:rPr>
               <a:pPr/>
-              <a:t>2015-12-24</a:t>
+              <a:t>12/31/2015</a:t>
             </a:fld>
             <a:endParaRPr lang="en-US">
               <a:solidFill>
@@ -2796,7 +2796,7 @@
                 </a:solidFill>
               </a:rPr>
               <a:pPr/>
-              <a:t>2015-12-24</a:t>
+              <a:t>12/31/2015</a:t>
             </a:fld>
             <a:endParaRPr lang="en-US">
               <a:solidFill>
@@ -3100,7 +3100,7 @@
                 </a:solidFill>
               </a:rPr>
               <a:pPr/>
-              <a:t>2015-12-24</a:t>
+              <a:t>12/31/2015</a:t>
             </a:fld>
             <a:endParaRPr lang="en-US">
               <a:solidFill>
@@ -3291,7 +3291,7 @@
             <a:fld id="{FBFA30F9-FDAC-4B3D-99E8-E7B16629F4BD}" type="datetime1">
               <a:rPr lang="en-US" smtClean="0"/>
               <a:pPr/>
-              <a:t>2015-12-24</a:t>
+              <a:t>12/31/2015</a:t>
             </a:fld>
             <a:endParaRPr lang="en-US"/>
           </a:p>
@@ -3352,7 +3352,7 @@
     </p:spTree>
     <p:extLst>
       <p:ext uri="{BB962C8B-B14F-4D97-AF65-F5344CB8AC3E}">
-        <p14:creationId xmlns:p14="http://schemas.microsoft.com/office/powerpoint/2010/main" xmlns="" val="3853629170"/>
+        <p14:creationId xmlns:p14="http://schemas.microsoft.com/office/powerpoint/2010/main" val="3853629170"/>
       </p:ext>
     </p:extLst>
   </p:cSld>
@@ -3561,7 +3561,7 @@
                 </a:solidFill>
               </a:rPr>
               <a:pPr/>
-              <a:t>2015-12-24</a:t>
+              <a:t>12/31/2015</a:t>
             </a:fld>
             <a:endParaRPr lang="en-US">
               <a:solidFill>
@@ -3758,7 +3758,7 @@
                 </a:solidFill>
               </a:rPr>
               <a:pPr/>
-              <a:t>2015-12-24</a:t>
+              <a:t>12/31/2015</a:t>
             </a:fld>
             <a:endParaRPr lang="en-US">
               <a:solidFill>
@@ -3965,7 +3965,7 @@
                 </a:solidFill>
               </a:rPr>
               <a:pPr/>
-              <a:t>2015-12-24</a:t>
+              <a:t>12/31/2015</a:t>
             </a:fld>
             <a:endParaRPr lang="en-US">
               <a:solidFill>
@@ -4232,7 +4232,7 @@
             <a:fld id="{4746D1D5-3367-4926-9F85-B0EF4997B1F0}" type="datetime1">
               <a:rPr lang="en-US" smtClean="0"/>
               <a:pPr/>
-              <a:t>2015-12-24</a:t>
+              <a:t>12/31/2015</a:t>
             </a:fld>
             <a:endParaRPr lang="en-US"/>
           </a:p>
@@ -4284,7 +4284,7 @@
     </p:spTree>
     <p:extLst>
       <p:ext uri="{BB962C8B-B14F-4D97-AF65-F5344CB8AC3E}">
-        <p14:creationId xmlns:p14="http://schemas.microsoft.com/office/powerpoint/2010/main" xmlns="" val="920028778"/>
+        <p14:creationId xmlns:p14="http://schemas.microsoft.com/office/powerpoint/2010/main" val="920028778"/>
       </p:ext>
     </p:extLst>
   </p:cSld>
@@ -4466,7 +4466,7 @@
             <a:fld id="{EEFEF73D-F372-4629-AF5C-F03AEEC7DB87}" type="datetime1">
               <a:rPr lang="en-US" smtClean="0"/>
               <a:pPr/>
-              <a:t>2015-12-24</a:t>
+              <a:t>12/31/2015</a:t>
             </a:fld>
             <a:endParaRPr lang="en-US"/>
           </a:p>
@@ -4518,7 +4518,7 @@
     </p:spTree>
     <p:extLst>
       <p:ext uri="{BB962C8B-B14F-4D97-AF65-F5344CB8AC3E}">
-        <p14:creationId xmlns:p14="http://schemas.microsoft.com/office/powerpoint/2010/main" xmlns="" val="1811021683"/>
+        <p14:creationId xmlns:p14="http://schemas.microsoft.com/office/powerpoint/2010/main" val="1811021683"/>
       </p:ext>
     </p:extLst>
   </p:cSld>
@@ -4835,7 +4835,7 @@
             <a:fld id="{84172F76-A721-4260-A99B-321A7AE3BD1C}" type="datetime1">
               <a:rPr lang="en-US" smtClean="0"/>
               <a:pPr/>
-              <a:t>2015-12-24</a:t>
+              <a:t>12/31/2015</a:t>
             </a:fld>
             <a:endParaRPr lang="en-US"/>
           </a:p>
@@ -4887,7 +4887,7 @@
     </p:spTree>
     <p:extLst>
       <p:ext uri="{BB962C8B-B14F-4D97-AF65-F5344CB8AC3E}">
-        <p14:creationId xmlns:p14="http://schemas.microsoft.com/office/powerpoint/2010/main" xmlns="" val="2218550592"/>
+        <p14:creationId xmlns:p14="http://schemas.microsoft.com/office/powerpoint/2010/main" val="2218550592"/>
       </p:ext>
     </p:extLst>
   </p:cSld>
@@ -4955,7 +4955,7 @@
             <a:fld id="{382C3D04-D3C6-4AC4-A49E-27B887B1DD97}" type="datetime1">
               <a:rPr lang="en-US" smtClean="0"/>
               <a:pPr/>
-              <a:t>2015-12-24</a:t>
+              <a:t>12/31/2015</a:t>
             </a:fld>
             <a:endParaRPr lang="en-US"/>
           </a:p>
@@ -5007,7 +5007,7 @@
     </p:spTree>
     <p:extLst>
       <p:ext uri="{BB962C8B-B14F-4D97-AF65-F5344CB8AC3E}">
-        <p14:creationId xmlns:p14="http://schemas.microsoft.com/office/powerpoint/2010/main" xmlns="" val="2703752757"/>
+        <p14:creationId xmlns:p14="http://schemas.microsoft.com/office/powerpoint/2010/main" val="2703752757"/>
       </p:ext>
     </p:extLst>
   </p:cSld>
@@ -5052,7 +5052,7 @@
             <a:fld id="{983C7051-4481-4FAB-A7F8-F08C73A6ACDD}" type="datetime1">
               <a:rPr lang="en-US" smtClean="0"/>
               <a:pPr/>
-              <a:t>2015-12-24</a:t>
+              <a:t>12/31/2015</a:t>
             </a:fld>
             <a:endParaRPr lang="en-US"/>
           </a:p>
@@ -5104,7 +5104,7 @@
     </p:spTree>
     <p:extLst>
       <p:ext uri="{BB962C8B-B14F-4D97-AF65-F5344CB8AC3E}">
-        <p14:creationId xmlns:p14="http://schemas.microsoft.com/office/powerpoint/2010/main" xmlns="" val="3616579995"/>
+        <p14:creationId xmlns:p14="http://schemas.microsoft.com/office/powerpoint/2010/main" val="3616579995"/>
       </p:ext>
     </p:extLst>
   </p:cSld>
@@ -5331,7 +5331,7 @@
             <a:fld id="{EDD2A6D5-197E-4B97-8A8D-6E9142EF7A19}" type="datetime1">
               <a:rPr lang="en-US" smtClean="0"/>
               <a:pPr/>
-              <a:t>2015-12-24</a:t>
+              <a:t>12/31/2015</a:t>
             </a:fld>
             <a:endParaRPr lang="en-US"/>
           </a:p>
@@ -5383,7 +5383,7 @@
     </p:spTree>
     <p:extLst>
       <p:ext uri="{BB962C8B-B14F-4D97-AF65-F5344CB8AC3E}">
-        <p14:creationId xmlns:p14="http://schemas.microsoft.com/office/powerpoint/2010/main" xmlns="" val="3543902006"/>
+        <p14:creationId xmlns:p14="http://schemas.microsoft.com/office/powerpoint/2010/main" val="3543902006"/>
       </p:ext>
     </p:extLst>
   </p:cSld>
@@ -5586,7 +5586,7 @@
             <a:fld id="{8398471A-0E0E-4A16-9F30-DB9B6A7DAB2B}" type="datetime1">
               <a:rPr lang="en-US" smtClean="0"/>
               <a:pPr/>
-              <a:t>2015-12-24</a:t>
+              <a:t>12/31/2015</a:t>
             </a:fld>
             <a:endParaRPr lang="en-US"/>
           </a:p>
@@ -5638,7 +5638,7 @@
     </p:spTree>
     <p:extLst>
       <p:ext uri="{BB962C8B-B14F-4D97-AF65-F5344CB8AC3E}">
-        <p14:creationId xmlns:p14="http://schemas.microsoft.com/office/powerpoint/2010/main" xmlns="" val="3098808309"/>
+        <p14:creationId xmlns:p14="http://schemas.microsoft.com/office/powerpoint/2010/main" val="3098808309"/>
       </p:ext>
     </p:extLst>
   </p:cSld>
@@ -5801,7 +5801,7 @@
             <a:fld id="{3D144DF7-1493-49F0-B21D-D8EFB7309AD4}" type="datetime1">
               <a:rPr lang="en-US" smtClean="0"/>
               <a:pPr/>
-              <a:t>2015-12-24</a:t>
+              <a:t>12/31/2015</a:t>
             </a:fld>
             <a:endParaRPr lang="en-US"/>
           </a:p>
@@ -5889,7 +5889,7 @@
     </p:spTree>
     <p:extLst>
       <p:ext uri="{BB962C8B-B14F-4D97-AF65-F5344CB8AC3E}">
-        <p14:creationId xmlns:p14="http://schemas.microsoft.com/office/powerpoint/2010/main" xmlns="" val="1974854377"/>
+        <p14:creationId xmlns:p14="http://schemas.microsoft.com/office/powerpoint/2010/main" val="1974854377"/>
       </p:ext>
     </p:extLst>
   </p:cSld>
@@ -6350,7 +6350,7 @@
                 </a:solidFill>
               </a:rPr>
               <a:pPr/>
-              <a:t>2015-12-24</a:t>
+              <a:t>12/31/2015</a:t>
             </a:fld>
             <a:endParaRPr lang="en-US">
               <a:solidFill>
@@ -7140,15 +7140,7 @@
                 <a:ea typeface="Calibri" pitchFamily="34" charset="0"/>
                 <a:cs typeface="Times New Roman" panose="02020603050405020304" pitchFamily="18" charset="0"/>
               </a:rPr>
-              <a:t>	</a:t>
-            </a:r>
-            <a:r>
-              <a:rPr lang="en-US" b="1" smtClean="0">
-                <a:latin typeface="+mj-lt"/>
-                <a:ea typeface="Calibri" pitchFamily="34" charset="0"/>
-                <a:cs typeface="Times New Roman" panose="02020603050405020304" pitchFamily="18" charset="0"/>
-              </a:rPr>
-              <a:t>51101594</a:t>
+              <a:t>	51101594</a:t>
             </a:r>
             <a:endParaRPr lang="en-US" b="1" dirty="0" smtClean="0">
               <a:latin typeface="+mj-lt"/>
@@ -7215,7 +7207,7 @@
           <a:blip r:embed="rId2" cstate="print">
             <a:extLst>
               <a:ext uri="{28A0092B-C50C-407E-A947-70E740481C1C}">
-                <a14:useLocalDpi xmlns:a14="http://schemas.microsoft.com/office/drawing/2010/main" xmlns="" val="0"/>
+                <a14:useLocalDpi xmlns:a14="http://schemas.microsoft.com/office/drawing/2010/main" val="0"/>
               </a:ext>
             </a:extLst>
           </a:blip>
@@ -7269,7 +7261,7 @@
     </p:spTree>
     <p:extLst>
       <p:ext uri="{BB962C8B-B14F-4D97-AF65-F5344CB8AC3E}">
-        <p14:creationId xmlns:p14="http://schemas.microsoft.com/office/powerpoint/2010/main" xmlns="" val="2237594800"/>
+        <p14:creationId xmlns:p14="http://schemas.microsoft.com/office/powerpoint/2010/main" val="2237594800"/>
       </p:ext>
     </p:extLst>
   </p:cSld>
@@ -7279,6 +7271,13 @@
   <p:transition>
     <p:fade/>
   </p:transition>
+  <p:timing>
+    <p:tnLst>
+      <p:par>
+        <p:cTn id="1" dur="indefinite" restart="never" nodeType="tmRoot"/>
+      </p:par>
+    </p:tnLst>
+  </p:timing>
 </p:sld>
 </file>
 
@@ -7335,17 +7334,7 @@
                 <a:latin typeface="Calibri" panose="020F0502020204030204" pitchFamily="34" charset="0"/>
                 <a:cs typeface="Times New Roman" panose="02020603050405020304" pitchFamily="18" charset="0"/>
               </a:rPr>
-              <a:t>Để có thể tính toán được các giá trị thanh ghi cũng như bộ nhớ, ta cần xây dựng một hệ thống mô phỏng các câu lệnh mà một tập tin nhị phân thực hiện được</a:t>
-            </a:r>
-            <a:r>
-              <a:rPr lang="vi-VN" sz="3200" smtClean="0">
-                <a:solidFill>
-                  <a:srgbClr val="000000"/>
-                </a:solidFill>
-                <a:latin typeface="Calibri" panose="020F0502020204030204" pitchFamily="34" charset="0"/>
-                <a:cs typeface="Times New Roman" panose="02020603050405020304" pitchFamily="18" charset="0"/>
-              </a:rPr>
-              <a:t>. </a:t>
+              <a:t>Để có thể tính toán được các giá trị thanh ghi cũng như bộ nhớ, ta cần xây dựng một hệ thống mô phỏng các câu lệnh mà một tập tin nhị phân thực hiện được. </a:t>
             </a:r>
             <a:endParaRPr lang="en-US" sz="3200" smtClean="0">
               <a:solidFill>
@@ -7381,47 +7370,7 @@
                 <a:latin typeface="Calibri" panose="020F0502020204030204" pitchFamily="34" charset="0"/>
                 <a:cs typeface="Times New Roman" panose="02020603050405020304" pitchFamily="18" charset="0"/>
               </a:rPr>
-              <a:t>ao </a:t>
-            </a:r>
-            <a:r>
-              <a:rPr lang="vi-VN" sz="3200" smtClean="0">
-                <a:solidFill>
-                  <a:srgbClr val="000000"/>
-                </a:solidFill>
-                <a:latin typeface="Calibri" panose="020F0502020204030204" pitchFamily="34" charset="0"/>
-                <a:cs typeface="Times New Roman" panose="02020603050405020304" pitchFamily="18" charset="0"/>
-              </a:rPr>
-              <a:t>gồm 2 </a:t>
-            </a:r>
-            <a:r>
-              <a:rPr lang="vi-VN" sz="3200" smtClean="0">
-                <a:solidFill>
-                  <a:srgbClr val="000000"/>
-                </a:solidFill>
-                <a:latin typeface="Calibri" panose="020F0502020204030204" pitchFamily="34" charset="0"/>
-                <a:cs typeface="Times New Roman" panose="02020603050405020304" pitchFamily="18" charset="0"/>
-              </a:rPr>
-              <a:t>phần </a:t>
-            </a:r>
-            <a:r>
-              <a:rPr lang="vi-VN" sz="3200" smtClean="0">
-                <a:solidFill>
-                  <a:srgbClr val="000000"/>
-                </a:solidFill>
-                <a:latin typeface="Calibri" panose="020F0502020204030204" pitchFamily="34" charset="0"/>
-                <a:cs typeface="Times New Roman" panose="02020603050405020304" pitchFamily="18" charset="0"/>
-              </a:rPr>
-              <a:t>chính </a:t>
-            </a:r>
-            <a:r>
-              <a:rPr lang="vi-VN" sz="3200" smtClean="0">
-                <a:solidFill>
-                  <a:srgbClr val="000000"/>
-                </a:solidFill>
-                <a:latin typeface="Calibri" panose="020F0502020204030204" pitchFamily="34" charset="0"/>
-                <a:cs typeface="Times New Roman" panose="02020603050405020304" pitchFamily="18" charset="0"/>
-              </a:rPr>
-              <a:t>là </a:t>
+              <a:t>ao gồm 2 phần chính là </a:t>
             </a:r>
             <a:r>
               <a:rPr lang="vi-VN" sz="3200" b="1" i="1" smtClean="0">
@@ -7571,11 +7520,7 @@
             </a:r>
             <a:r>
               <a:rPr lang="en-US" smtClean="0"/>
-              <a:t> </a:t>
-            </a:r>
-            <a:r>
-              <a:rPr lang="en-US" smtClean="0"/>
-              <a:t>(</a:t>
+              <a:t> (</a:t>
             </a:r>
             <a:r>
               <a:rPr lang="en-US" dirty="0"/>
@@ -7592,7 +7537,7 @@
     </p:spTree>
     <p:extLst>
       <p:ext uri="{BB962C8B-B14F-4D97-AF65-F5344CB8AC3E}">
-        <p14:creationId xmlns:p14="http://schemas.microsoft.com/office/powerpoint/2010/main" xmlns="" val="802189261"/>
+        <p14:creationId xmlns:p14="http://schemas.microsoft.com/office/powerpoint/2010/main" val="802189261"/>
       </p:ext>
     </p:extLst>
   </p:cSld>
@@ -7602,6 +7547,13 @@
   <p:transition>
     <p:fade/>
   </p:transition>
+  <p:timing>
+    <p:tnLst>
+      <p:par>
+        <p:cTn id="1" dur="indefinite" restart="never" nodeType="tmRoot"/>
+      </p:par>
+    </p:tnLst>
+  </p:timing>
 </p:sld>
 </file>
 
@@ -7839,11 +7791,7 @@
             </a:r>
             <a:r>
               <a:rPr lang="en-US" smtClean="0"/>
-              <a:t> </a:t>
-            </a:r>
-            <a:r>
-              <a:rPr lang="en-US" smtClean="0"/>
-              <a:t>(9)</a:t>
+              <a:t> (9)</a:t>
             </a:r>
             <a:endParaRPr lang="en-US" dirty="0"/>
           </a:p>
@@ -7852,7 +7800,7 @@
     </p:spTree>
     <p:extLst>
       <p:ext uri="{BB962C8B-B14F-4D97-AF65-F5344CB8AC3E}">
-        <p14:creationId xmlns:p14="http://schemas.microsoft.com/office/powerpoint/2010/main" xmlns="" val="2619747564"/>
+        <p14:creationId xmlns:p14="http://schemas.microsoft.com/office/powerpoint/2010/main" val="2619747564"/>
       </p:ext>
     </p:extLst>
   </p:cSld>
@@ -8127,7 +8075,7 @@
     </p:spTree>
     <p:extLst>
       <p:ext uri="{BB962C8B-B14F-4D97-AF65-F5344CB8AC3E}">
-        <p14:creationId xmlns:p14="http://schemas.microsoft.com/office/powerpoint/2010/main" xmlns="" val="311406360"/>
+        <p14:creationId xmlns:p14="http://schemas.microsoft.com/office/powerpoint/2010/main" val="311406360"/>
       </p:ext>
     </p:extLst>
   </p:cSld>
@@ -8568,7 +8516,7 @@
     </p:spTree>
     <p:extLst>
       <p:ext uri="{BB962C8B-B14F-4D97-AF65-F5344CB8AC3E}">
-        <p14:creationId xmlns:p14="http://schemas.microsoft.com/office/powerpoint/2010/main" xmlns="" val="576942395"/>
+        <p14:creationId xmlns:p14="http://schemas.microsoft.com/office/powerpoint/2010/main" val="576942395"/>
       </p:ext>
     </p:extLst>
   </p:cSld>
@@ -8990,7 +8938,7 @@
     </p:spTree>
     <p:extLst>
       <p:ext uri="{BB962C8B-B14F-4D97-AF65-F5344CB8AC3E}">
-        <p14:creationId xmlns:p14="http://schemas.microsoft.com/office/powerpoint/2010/main" xmlns="" val="95762785"/>
+        <p14:creationId xmlns:p14="http://schemas.microsoft.com/office/powerpoint/2010/main" val="95762785"/>
       </p:ext>
     </p:extLst>
   </p:cSld>
@@ -9355,11 +9303,7 @@
             </a:r>
             <a:r>
               <a:rPr lang="en-US" smtClean="0"/>
-              <a:t>(</a:t>
-            </a:r>
-            <a:r>
-              <a:rPr lang="en-US" smtClean="0"/>
-              <a:t>12)</a:t>
+              <a:t>(12)</a:t>
             </a:r>
             <a:endParaRPr lang="en-US" dirty="0"/>
           </a:p>
@@ -9368,7 +9312,7 @@
     </p:spTree>
     <p:extLst>
       <p:ext uri="{BB962C8B-B14F-4D97-AF65-F5344CB8AC3E}">
-        <p14:creationId xmlns:p14="http://schemas.microsoft.com/office/powerpoint/2010/main" xmlns="" val="404274276"/>
+        <p14:creationId xmlns:p14="http://schemas.microsoft.com/office/powerpoint/2010/main" val="404274276"/>
       </p:ext>
     </p:extLst>
   </p:cSld>
@@ -9798,11 +9742,7 @@
             </a:r>
             <a:r>
               <a:rPr lang="en-US" smtClean="0"/>
-              <a:t>(</a:t>
-            </a:r>
-            <a:r>
-              <a:rPr lang="en-US" smtClean="0"/>
-              <a:t>13)</a:t>
+              <a:t>(13)</a:t>
             </a:r>
             <a:endParaRPr lang="en-US" dirty="0"/>
           </a:p>
@@ -9811,7 +9751,7 @@
     </p:spTree>
     <p:extLst>
       <p:ext uri="{BB962C8B-B14F-4D97-AF65-F5344CB8AC3E}">
-        <p14:creationId xmlns:p14="http://schemas.microsoft.com/office/powerpoint/2010/main" xmlns="" val="117280957"/>
+        <p14:creationId xmlns:p14="http://schemas.microsoft.com/office/powerpoint/2010/main" val="117280957"/>
       </p:ext>
     </p:extLst>
   </p:cSld>
@@ -10526,7 +10466,7 @@
     </p:spTree>
     <p:extLst>
       <p:ext uri="{BB962C8B-B14F-4D97-AF65-F5344CB8AC3E}">
-        <p14:creationId xmlns:p14="http://schemas.microsoft.com/office/powerpoint/2010/main" xmlns="" val="2099971137"/>
+        <p14:creationId xmlns:p14="http://schemas.microsoft.com/office/powerpoint/2010/main" val="2099971137"/>
       </p:ext>
     </p:extLst>
   </p:cSld>
@@ -10536,6 +10476,13 @@
   <p:transition>
     <p:fade/>
   </p:transition>
+  <p:timing>
+    <p:tnLst>
+      <p:par>
+        <p:cTn id="1" dur="indefinite" restart="never" nodeType="tmRoot"/>
+      </p:par>
+    </p:tnLst>
+  </p:timing>
 </p:sld>
 </file>
 
@@ -11183,7 +11130,7 @@
     </p:spTree>
     <p:extLst>
       <p:ext uri="{BB962C8B-B14F-4D97-AF65-F5344CB8AC3E}">
-        <p14:creationId xmlns:p14="http://schemas.microsoft.com/office/powerpoint/2010/main" xmlns="" val="3760410251"/>
+        <p14:creationId xmlns:p14="http://schemas.microsoft.com/office/powerpoint/2010/main" val="3760410251"/>
       </p:ext>
     </p:extLst>
   </p:cSld>
@@ -11767,34 +11714,7 @@
                 <a:cs typeface="Times New Roman" panose="02020603050405020304" pitchFamily="18" charset="0"/>
                 <a:sym typeface="Wingdings" panose="05000000000000000000" pitchFamily="2" charset="2"/>
               </a:rPr>
-              <a:t>BE-PUM </a:t>
-            </a:r>
-            <a:r>
-              <a:rPr lang="en-GB" sz="3200" smtClean="0">
-                <a:latin typeface="Calibri" pitchFamily="34" charset="0"/>
-                <a:ea typeface="Calibri" panose="020F0502020204030204" pitchFamily="34" charset="0"/>
-                <a:cs typeface="Times New Roman" panose="02020603050405020304" pitchFamily="18" charset="0"/>
-                <a:sym typeface="Wingdings" panose="05000000000000000000" pitchFamily="2" charset="2"/>
-              </a:rPr>
-              <a:t>được viết bằng ngôn ngữ Java, hiện thực các biến môi trường được sử dụng trong assembly, hiện thực các câu lệnh </a:t>
-            </a:r>
-            <a:r>
-              <a:rPr lang="en-GB" sz="3200" smtClean="0">
-                <a:latin typeface="Calibri" pitchFamily="34" charset="0"/>
-                <a:ea typeface="Calibri" panose="020F0502020204030204" pitchFamily="34" charset="0"/>
-                <a:cs typeface="Times New Roman" panose="02020603050405020304" pitchFamily="18" charset="0"/>
-                <a:sym typeface="Wingdings" panose="05000000000000000000" pitchFamily="2" charset="2"/>
-              </a:rPr>
-              <a:t>assembly</a:t>
-            </a:r>
-            <a:r>
-              <a:rPr lang="en-GB" sz="3200" smtClean="0">
-                <a:latin typeface="Calibri" pitchFamily="34" charset="0"/>
-                <a:ea typeface="Calibri" panose="020F0502020204030204" pitchFamily="34" charset="0"/>
-                <a:cs typeface="Times New Roman" panose="02020603050405020304" pitchFamily="18" charset="0"/>
-                <a:sym typeface="Wingdings" panose="05000000000000000000" pitchFamily="2" charset="2"/>
-              </a:rPr>
-              <a:t>.</a:t>
+              <a:t>BE-PUM được viết bằng ngôn ngữ Java, hiện thực các biến môi trường được sử dụng trong assembly, hiện thực các câu lệnh assembly.</a:t>
             </a:r>
             <a:endParaRPr lang="en-GB" sz="3200" smtClean="0">
               <a:latin typeface="Calibri" pitchFamily="34" charset="0"/>
@@ -11915,7 +11835,7 @@
     </p:spTree>
     <p:extLst>
       <p:ext uri="{BB962C8B-B14F-4D97-AF65-F5344CB8AC3E}">
-        <p14:creationId xmlns:p14="http://schemas.microsoft.com/office/powerpoint/2010/main" xmlns="" val="2974630176"/>
+        <p14:creationId xmlns:p14="http://schemas.microsoft.com/office/powerpoint/2010/main" val="2974630176"/>
       </p:ext>
     </p:extLst>
   </p:cSld>
@@ -11925,6 +11845,13 @@
   <p:transition>
     <p:fade/>
   </p:transition>
+  <p:timing>
+    <p:tnLst>
+      <p:par>
+        <p:cTn id="1" dur="indefinite" restart="never" nodeType="tmRoot"/>
+      </p:par>
+    </p:tnLst>
+  </p:timing>
 </p:sld>
 </file>
 
@@ -12596,7 +12523,7 @@
     </p:spTree>
     <p:extLst>
       <p:ext uri="{BB962C8B-B14F-4D97-AF65-F5344CB8AC3E}">
-        <p14:creationId xmlns:p14="http://schemas.microsoft.com/office/powerpoint/2010/main" xmlns="" val="3760410251"/>
+        <p14:creationId xmlns:p14="http://schemas.microsoft.com/office/powerpoint/2010/main" val="3760410251"/>
       </p:ext>
     </p:extLst>
   </p:cSld>
@@ -13822,7 +13749,7 @@
     </p:spTree>
     <p:extLst>
       <p:ext uri="{BB962C8B-B14F-4D97-AF65-F5344CB8AC3E}">
-        <p14:creationId xmlns:p14="http://schemas.microsoft.com/office/powerpoint/2010/main" xmlns="" val="2328850623"/>
+        <p14:creationId xmlns:p14="http://schemas.microsoft.com/office/powerpoint/2010/main" val="2328850623"/>
       </p:ext>
     </p:extLst>
   </p:cSld>
@@ -15193,7 +15120,7 @@
     </p:spTree>
     <p:extLst>
       <p:ext uri="{BB962C8B-B14F-4D97-AF65-F5344CB8AC3E}">
-        <p14:creationId xmlns:p14="http://schemas.microsoft.com/office/powerpoint/2010/main" xmlns="" val="3412271576"/>
+        <p14:creationId xmlns:p14="http://schemas.microsoft.com/office/powerpoint/2010/main" val="3412271576"/>
       </p:ext>
     </p:extLst>
   </p:cSld>
@@ -15203,6 +15130,13 @@
   <p:transition>
     <p:fade/>
   </p:transition>
+  <p:timing>
+    <p:tnLst>
+      <p:par>
+        <p:cTn id="1" dur="indefinite" restart="never" nodeType="tmRoot"/>
+      </p:par>
+    </p:tnLst>
+  </p:timing>
 </p:sld>
 </file>
 
@@ -15293,11 +15227,7 @@
             </a:r>
             <a:r>
               <a:rPr lang="en-US" smtClean="0"/>
-              <a:t> </a:t>
-            </a:r>
-            <a:r>
-              <a:rPr lang="en-US" smtClean="0"/>
-              <a:t>đề (5</a:t>
+              <a:t> đề (5</a:t>
             </a:r>
             <a:r>
               <a:rPr lang="en-US" dirty="0" smtClean="0"/>
@@ -15694,7 +15624,7 @@
     </p:spTree>
     <p:extLst>
       <p:ext uri="{BB962C8B-B14F-4D97-AF65-F5344CB8AC3E}">
-        <p14:creationId xmlns:p14="http://schemas.microsoft.com/office/powerpoint/2010/main" xmlns="" val="234341932"/>
+        <p14:creationId xmlns:p14="http://schemas.microsoft.com/office/powerpoint/2010/main" val="234341932"/>
       </p:ext>
     </p:extLst>
   </p:cSld>
@@ -15704,6 +15634,13 @@
   <p:transition>
     <p:fade/>
   </p:transition>
+  <p:timing>
+    <p:tnLst>
+      <p:par>
+        <p:cTn id="1" dur="indefinite" restart="never" nodeType="tmRoot"/>
+      </p:par>
+    </p:tnLst>
+  </p:timing>
 </p:sld>
 </file>
 
@@ -15794,11 +15731,7 @@
             </a:r>
             <a:r>
               <a:rPr lang="en-US" smtClean="0"/>
-              <a:t> </a:t>
-            </a:r>
-            <a:r>
-              <a:rPr lang="en-US" smtClean="0"/>
-              <a:t>đề (6</a:t>
+              <a:t> đề (6</a:t>
             </a:r>
             <a:r>
               <a:rPr lang="en-US" dirty="0" smtClean="0"/>
@@ -16179,7 +16112,7 @@
     </p:spTree>
     <p:extLst>
       <p:ext uri="{BB962C8B-B14F-4D97-AF65-F5344CB8AC3E}">
-        <p14:creationId xmlns:p14="http://schemas.microsoft.com/office/powerpoint/2010/main" xmlns="" val="1225225252"/>
+        <p14:creationId xmlns:p14="http://schemas.microsoft.com/office/powerpoint/2010/main" val="1225225252"/>
       </p:ext>
     </p:extLst>
   </p:cSld>
@@ -16189,6 +16122,13 @@
   <p:transition>
     <p:fade/>
   </p:transition>
+  <p:timing>
+    <p:tnLst>
+      <p:par>
+        <p:cTn id="1" dur="indefinite" restart="never" nodeType="tmRoot"/>
+      </p:par>
+    </p:tnLst>
+  </p:timing>
 </p:sld>
 </file>
 
@@ -16388,11 +16328,7 @@
             </a:r>
             <a:r>
               <a:rPr lang="en-US" smtClean="0"/>
-              <a:t> </a:t>
-            </a:r>
-            <a:r>
-              <a:rPr lang="en-US" smtClean="0"/>
-              <a:t>(7</a:t>
+              <a:t> (7</a:t>
             </a:r>
             <a:r>
               <a:rPr lang="en-US" dirty="0" smtClean="0"/>
@@ -16405,7 +16341,7 @@
     </p:spTree>
     <p:extLst>
       <p:ext uri="{BB962C8B-B14F-4D97-AF65-F5344CB8AC3E}">
-        <p14:creationId xmlns:p14="http://schemas.microsoft.com/office/powerpoint/2010/main" xmlns="" val="4149458452"/>
+        <p14:creationId xmlns:p14="http://schemas.microsoft.com/office/powerpoint/2010/main" val="4149458452"/>
       </p:ext>
     </p:extLst>
   </p:cSld>
@@ -16415,6 +16351,13 @@
   <p:transition>
     <p:fade/>
   </p:transition>
+  <p:timing>
+    <p:tnLst>
+      <p:par>
+        <p:cTn id="1" dur="indefinite" restart="never" nodeType="tmRoot"/>
+      </p:par>
+    </p:tnLst>
+  </p:timing>
 </p:sld>
 </file>
 
@@ -16718,11 +16661,7 @@
             </a:r>
             <a:r>
               <a:rPr lang="en-US" sz="3600" b="1" i="1" smtClean="0"/>
-              <a:t> </a:t>
-            </a:r>
-            <a:r>
-              <a:rPr lang="en-US" sz="3600" b="1" i="1" smtClean="0"/>
-              <a:t>tiêu</a:t>
+              <a:t> tiêu</a:t>
             </a:r>
             <a:endParaRPr lang="en-US" sz="3600" b="1" i="1" dirty="0" smtClean="0"/>
           </a:p>
@@ -16848,11 +16787,7 @@
             </a:r>
             <a:r>
               <a:rPr lang="en-US" smtClean="0"/>
-              <a:t> </a:t>
-            </a:r>
-            <a:r>
-              <a:rPr lang="en-US" smtClean="0"/>
-              <a:t>đề </a:t>
+              <a:t> đề </a:t>
             </a:r>
             <a:r>
               <a:rPr lang="en-US" dirty="0" smtClean="0"/>
@@ -16865,7 +16800,7 @@
     </p:spTree>
     <p:extLst>
       <p:ext uri="{BB962C8B-B14F-4D97-AF65-F5344CB8AC3E}">
-        <p14:creationId xmlns:p14="http://schemas.microsoft.com/office/powerpoint/2010/main" xmlns="" val="1120252062"/>
+        <p14:creationId xmlns:p14="http://schemas.microsoft.com/office/powerpoint/2010/main" val="1120252062"/>
       </p:ext>
     </p:extLst>
   </p:cSld>
@@ -16875,6 +16810,13 @@
   <p:transition>
     <p:fade/>
   </p:transition>
+  <p:timing>
+    <p:tnLst>
+      <p:par>
+        <p:cTn id="1" dur="indefinite" restart="never" nodeType="tmRoot"/>
+      </p:par>
+    </p:tnLst>
+  </p:timing>
 </p:sld>
 </file>
 
@@ -17534,7 +17476,7 @@
     </p:spTree>
     <p:extLst>
       <p:ext uri="{BB962C8B-B14F-4D97-AF65-F5344CB8AC3E}">
-        <p14:creationId xmlns:p14="http://schemas.microsoft.com/office/powerpoint/2010/main" xmlns="" val="3760410251"/>
+        <p14:creationId xmlns:p14="http://schemas.microsoft.com/office/powerpoint/2010/main" val="3760410251"/>
       </p:ext>
     </p:extLst>
   </p:cSld>
@@ -17764,7 +17706,7 @@
     </p:spTree>
     <p:extLst>
       <p:ext uri="{BB962C8B-B14F-4D97-AF65-F5344CB8AC3E}">
-        <p14:creationId xmlns:p14="http://schemas.microsoft.com/office/powerpoint/2010/main" xmlns="" val="2173614672"/>
+        <p14:creationId xmlns:p14="http://schemas.microsoft.com/office/powerpoint/2010/main" val="2173614672"/>
       </p:ext>
     </p:extLst>
   </p:cSld>
@@ -17774,6 +17716,13 @@
   <p:transition>
     <p:fade/>
   </p:transition>
+  <p:timing>
+    <p:tnLst>
+      <p:par>
+        <p:cTn id="1" dur="indefinite" restart="never" nodeType="tmRoot"/>
+      </p:par>
+    </p:tnLst>
+  </p:timing>
 </p:sld>
 </file>
 
@@ -18120,7 +18069,7 @@
     </p:spTree>
     <p:extLst>
       <p:ext uri="{BB962C8B-B14F-4D97-AF65-F5344CB8AC3E}">
-        <p14:creationId xmlns:p14="http://schemas.microsoft.com/office/powerpoint/2010/main" xmlns="" val="1980110039"/>
+        <p14:creationId xmlns:p14="http://schemas.microsoft.com/office/powerpoint/2010/main" val="1980110039"/>
       </p:ext>
     </p:extLst>
   </p:cSld>
@@ -18130,6 +18079,13 @@
   <p:transition>
     <p:fade/>
   </p:transition>
+  <p:timing>
+    <p:tnLst>
+      <p:par>
+        <p:cTn id="1" dur="indefinite" restart="never" nodeType="tmRoot"/>
+      </p:par>
+    </p:tnLst>
+  </p:timing>
 </p:sld>
 </file>
 
@@ -18202,7 +18158,7 @@
           <p:nvPr>
             <p:extLst>
               <p:ext uri="{D42A27DB-BD31-4B8C-83A1-F6EECF244321}">
-                <p14:modId xmlns:p14="http://schemas.microsoft.com/office/powerpoint/2010/main" xmlns="" val="3865403810"/>
+                <p14:modId xmlns:p14="http://schemas.microsoft.com/office/powerpoint/2010/main" val="3865403810"/>
               </p:ext>
             </p:extLst>
           </p:nvPr>
@@ -19194,7 +19150,7 @@
     </p:spTree>
     <p:extLst>
       <p:ext uri="{BB962C8B-B14F-4D97-AF65-F5344CB8AC3E}">
-        <p14:creationId xmlns:p14="http://schemas.microsoft.com/office/powerpoint/2010/main" xmlns="" val="1237084483"/>
+        <p14:creationId xmlns:p14="http://schemas.microsoft.com/office/powerpoint/2010/main" val="1237084483"/>
       </p:ext>
     </p:extLst>
   </p:cSld>
@@ -19768,6 +19724,13 @@
   <p:transition>
     <p:fade/>
   </p:transition>
+  <p:timing>
+    <p:tnLst>
+      <p:par>
+        <p:cTn id="1" dur="indefinite" restart="never" nodeType="tmRoot"/>
+      </p:par>
+    </p:tnLst>
+  </p:timing>
 </p:sld>
 </file>
 
@@ -19840,7 +19803,7 @@
           <p:nvPr>
             <p:extLst>
               <p:ext uri="{D42A27DB-BD31-4B8C-83A1-F6EECF244321}">
-                <p14:modId xmlns:p14="http://schemas.microsoft.com/office/powerpoint/2010/main" xmlns="" val="3020989487"/>
+                <p14:modId xmlns:p14="http://schemas.microsoft.com/office/powerpoint/2010/main" val="3020989487"/>
               </p:ext>
             </p:extLst>
           </p:nvPr>
@@ -20256,7 +20219,7 @@
           <a:effectLst/>
           <a:extLst>
             <a:ext uri="{91240B29-F687-4F45-9708-019B960494DF}">
-              <a14:hiddenLine xmlns:a14="http://schemas.microsoft.com/office/drawing/2010/main" xmlns="" w="9525">
+              <a14:hiddenLine xmlns:a14="http://schemas.microsoft.com/office/drawing/2010/main" w="9525">
                 <a:solidFill>
                   <a:schemeClr val="tx1"/>
                 </a:solidFill>
@@ -20266,7 +20229,7 @@
               </a14:hiddenLine>
             </a:ext>
             <a:ext uri="{AF507438-7753-43E0-B8FC-AC1667EBCBE1}">
-              <a14:hiddenEffects xmlns:a14="http://schemas.microsoft.com/office/drawing/2010/main" xmlns="">
+              <a14:hiddenEffects xmlns:a14="http://schemas.microsoft.com/office/drawing/2010/main">
                 <a:effectLst>
                   <a:outerShdw dist="35921" dir="2700000" algn="ctr" rotWithShape="0">
                     <a:schemeClr val="bg2"/>
@@ -20696,24 +20659,24 @@
             </a:pPr>
             <a:r>
               <a:rPr lang="en-US" sz="2400" dirty="0" smtClean="0">
-                <a:latin typeface="+mj-lt"/>
+                <a:latin typeface="Calibri (Headings)"/>
               </a:rPr>
               <a:t>C</a:t>
             </a:r>
             <a:r>
               <a:rPr lang="vi-VN" sz="2400" dirty="0" smtClean="0">
-                <a:latin typeface="+mj-lt"/>
+                <a:latin typeface="Calibri (Headings)"/>
               </a:rPr>
               <a:t>ông </a:t>
             </a:r>
             <a:r>
               <a:rPr lang="vi-VN" sz="2400" dirty="0">
-                <a:latin typeface="+mj-lt"/>
+                <a:latin typeface="Calibri (Headings)"/>
               </a:rPr>
               <a:t>thức xác định giá trị số thực như sau: </a:t>
             </a:r>
             <a:endParaRPr lang="en-GB" sz="2400" dirty="0" smtClean="0">
-              <a:latin typeface="+mj-lt"/>
+              <a:latin typeface="Calibri (Headings)"/>
             </a:endParaRPr>
           </a:p>
           <a:p>
@@ -20731,48 +20694,48 @@
             </a:r>
             <a:r>
               <a:rPr lang="vi-VN" sz="2400" dirty="0" smtClean="0">
-                <a:latin typeface="+mj-lt"/>
+                <a:latin typeface="Calibri (Headings)"/>
               </a:rPr>
               <a:t>X </a:t>
             </a:r>
             <a:r>
               <a:rPr lang="vi-VN" sz="2400" dirty="0">
-                <a:latin typeface="+mj-lt"/>
+                <a:latin typeface="Calibri (Headings)"/>
               </a:rPr>
               <a:t>= (-1)</a:t>
             </a:r>
             <a:r>
               <a:rPr lang="vi-VN" sz="2400" baseline="30000" dirty="0">
-                <a:latin typeface="+mj-lt"/>
+                <a:latin typeface="Calibri (Headings)"/>
               </a:rPr>
               <a:t>S</a:t>
             </a:r>
             <a:r>
               <a:rPr lang="vi-VN" sz="2400" dirty="0">
-                <a:latin typeface="+mj-lt"/>
+                <a:latin typeface="Calibri (Headings)"/>
               </a:rPr>
               <a:t> * 1.m * </a:t>
             </a:r>
             <a:r>
               <a:rPr lang="vi-VN" sz="2400" dirty="0" smtClean="0">
-                <a:latin typeface="+mj-lt"/>
+                <a:latin typeface="Calibri (Headings)"/>
               </a:rPr>
               <a:t>2</a:t>
             </a:r>
             <a:r>
               <a:rPr lang="vi-VN" sz="2400" baseline="30000" dirty="0" smtClean="0">
-                <a:latin typeface="+mj-lt"/>
+                <a:latin typeface="Calibri (Headings)"/>
               </a:rPr>
               <a:t>e-1</a:t>
             </a:r>
             <a:r>
               <a:rPr lang="en-US" sz="2400" baseline="30000" dirty="0" smtClean="0">
-                <a:latin typeface="+mj-lt"/>
+                <a:latin typeface="Calibri (Headings)"/>
               </a:rPr>
               <a:t>023</a:t>
             </a:r>
             <a:endParaRPr lang="vi-VN" sz="2400" dirty="0">
-              <a:latin typeface="+mj-lt"/>
+              <a:latin typeface="Calibri (Headings)"/>
             </a:endParaRPr>
           </a:p>
           <a:p>
@@ -20894,7 +20857,7 @@
     </p:spTree>
     <p:extLst>
       <p:ext uri="{BB962C8B-B14F-4D97-AF65-F5344CB8AC3E}">
-        <p14:creationId xmlns:p14="http://schemas.microsoft.com/office/powerpoint/2010/main" xmlns="" val="3941733741"/>
+        <p14:creationId xmlns:p14="http://schemas.microsoft.com/office/powerpoint/2010/main" val="3941733741"/>
       </p:ext>
     </p:extLst>
   </p:cSld>
@@ -21222,7 +21185,7 @@
     </p:spTree>
     <p:extLst>
       <p:ext uri="{BB962C8B-B14F-4D97-AF65-F5344CB8AC3E}">
-        <p14:creationId xmlns:p14="http://schemas.microsoft.com/office/powerpoint/2010/main" xmlns="" val="352738125"/>
+        <p14:creationId xmlns:p14="http://schemas.microsoft.com/office/powerpoint/2010/main" val="352738125"/>
       </p:ext>
     </p:extLst>
   </p:cSld>
@@ -21605,7 +21568,7 @@
     </p:spTree>
     <p:extLst>
       <p:ext uri="{BB962C8B-B14F-4D97-AF65-F5344CB8AC3E}">
-        <p14:creationId xmlns:p14="http://schemas.microsoft.com/office/powerpoint/2010/main" xmlns="" val="208946354"/>
+        <p14:creationId xmlns:p14="http://schemas.microsoft.com/office/powerpoint/2010/main" val="208946354"/>
       </p:ext>
     </p:extLst>
   </p:cSld>
@@ -21615,6 +21578,13 @@
   <p:transition>
     <p:fade/>
   </p:transition>
+  <p:timing>
+    <p:tnLst>
+      <p:par>
+        <p:cTn id="1" dur="indefinite" restart="never" nodeType="tmRoot"/>
+      </p:par>
+    </p:tnLst>
+  </p:timing>
 </p:sld>
 </file>
 
@@ -21906,7 +21876,7 @@
     </p:spTree>
     <p:extLst>
       <p:ext uri="{BB962C8B-B14F-4D97-AF65-F5344CB8AC3E}">
-        <p14:creationId xmlns:p14="http://schemas.microsoft.com/office/powerpoint/2010/main" xmlns="" val="1499292789"/>
+        <p14:creationId xmlns:p14="http://schemas.microsoft.com/office/powerpoint/2010/main" val="1499292789"/>
       </p:ext>
     </p:extLst>
   </p:cSld>
@@ -21916,6 +21886,13 @@
   <p:transition>
     <p:fade/>
   </p:transition>
+  <p:timing>
+    <p:tnLst>
+      <p:par>
+        <p:cTn id="1" dur="indefinite" restart="never" nodeType="tmRoot"/>
+      </p:par>
+    </p:tnLst>
+  </p:timing>
 </p:sld>
 </file>
 
@@ -22238,7 +22215,7 @@
     </p:spTree>
     <p:extLst>
       <p:ext uri="{BB962C8B-B14F-4D97-AF65-F5344CB8AC3E}">
-        <p14:creationId xmlns:p14="http://schemas.microsoft.com/office/powerpoint/2010/main" xmlns="" val="1099785089"/>
+        <p14:creationId xmlns:p14="http://schemas.microsoft.com/office/powerpoint/2010/main" val="1099785089"/>
       </p:ext>
     </p:extLst>
   </p:cSld>
@@ -22248,6 +22225,13 @@
   <p:transition>
     <p:fade/>
   </p:transition>
+  <p:timing>
+    <p:tnLst>
+      <p:par>
+        <p:cTn id="1" dur="indefinite" restart="never" nodeType="tmRoot"/>
+      </p:par>
+    </p:tnLst>
+  </p:timing>
 </p:sld>
 </file>
 
@@ -22539,7 +22523,7 @@
     </p:spTree>
     <p:extLst>
       <p:ext uri="{BB962C8B-B14F-4D97-AF65-F5344CB8AC3E}">
-        <p14:creationId xmlns:p14="http://schemas.microsoft.com/office/powerpoint/2010/main" xmlns="" val="2149192252"/>
+        <p14:creationId xmlns:p14="http://schemas.microsoft.com/office/powerpoint/2010/main" val="2149192252"/>
       </p:ext>
     </p:extLst>
   </p:cSld>
@@ -22624,7 +22608,7 @@
           <p:nvPr>
             <p:extLst>
               <p:ext uri="{D42A27DB-BD31-4B8C-83A1-F6EECF244321}">
-                <p14:modId xmlns:p14="http://schemas.microsoft.com/office/powerpoint/2010/main" xmlns="" val="1173873043"/>
+                <p14:modId xmlns:p14="http://schemas.microsoft.com/office/powerpoint/2010/main" val="861858347"/>
               </p:ext>
             </p:extLst>
           </p:nvPr>
@@ -22818,7 +22802,15 @@
                           <a:latin typeface="+mj-lt"/>
                           <a:cs typeface="Times New Roman" panose="02020603050405020304" pitchFamily="18" charset="0"/>
                         </a:rPr>
-                        <a:t>Double Precisian</a:t>
+                        <a:t>Double </a:t>
+                      </a:r>
+                      <a:r>
+                        <a:rPr lang="en-US" sz="2800" u="none" strike="noStrike" dirty="0" smtClean="0">
+                          <a:effectLst/>
+                          <a:latin typeface="+mj-lt"/>
+                          <a:cs typeface="Times New Roman" panose="02020603050405020304" pitchFamily="18" charset="0"/>
+                        </a:rPr>
+                        <a:t>Precision</a:t>
                       </a:r>
                       <a:endParaRPr lang="en-US" sz="2800" b="0" i="0" u="none" strike="noStrike" dirty="0">
                         <a:solidFill>
@@ -23121,7 +23113,7 @@
     </p:spTree>
     <p:extLst>
       <p:ext uri="{BB962C8B-B14F-4D97-AF65-F5344CB8AC3E}">
-        <p14:creationId xmlns:p14="http://schemas.microsoft.com/office/powerpoint/2010/main" xmlns="" val="1015791478"/>
+        <p14:creationId xmlns:p14="http://schemas.microsoft.com/office/powerpoint/2010/main" val="1015791478"/>
       </p:ext>
     </p:extLst>
   </p:cSld>
@@ -23287,7 +23279,7 @@
           <p:nvPr>
             <p:extLst>
               <p:ext uri="{D42A27DB-BD31-4B8C-83A1-F6EECF244321}">
-                <p14:modId xmlns:p14="http://schemas.microsoft.com/office/powerpoint/2010/main" xmlns="" val="296765292"/>
+                <p14:modId xmlns:p14="http://schemas.microsoft.com/office/powerpoint/2010/main" val="296765292"/>
               </p:ext>
             </p:extLst>
           </p:nvPr>
@@ -24113,7 +24105,7 @@
     </p:spTree>
     <p:extLst>
       <p:ext uri="{BB962C8B-B14F-4D97-AF65-F5344CB8AC3E}">
-        <p14:creationId xmlns:p14="http://schemas.microsoft.com/office/powerpoint/2010/main" xmlns="" val="1010073232"/>
+        <p14:creationId xmlns:p14="http://schemas.microsoft.com/office/powerpoint/2010/main" val="1010073232"/>
       </p:ext>
     </p:extLst>
   </p:cSld>
@@ -24371,7 +24363,7 @@
     </p:spTree>
     <p:extLst>
       <p:ext uri="{BB962C8B-B14F-4D97-AF65-F5344CB8AC3E}">
-        <p14:creationId xmlns:p14="http://schemas.microsoft.com/office/powerpoint/2010/main" xmlns="" val="284446455"/>
+        <p14:creationId xmlns:p14="http://schemas.microsoft.com/office/powerpoint/2010/main" val="284446455"/>
       </p:ext>
     </p:extLst>
   </p:cSld>
@@ -24523,7 +24515,7 @@
           <p:nvPr>
             <p:extLst>
               <p:ext uri="{D42A27DB-BD31-4B8C-83A1-F6EECF244321}">
-                <p14:modId xmlns:p14="http://schemas.microsoft.com/office/powerpoint/2010/main" xmlns="" val="2903906726"/>
+                <p14:modId xmlns:p14="http://schemas.microsoft.com/office/powerpoint/2010/main" val="2316610991"/>
               </p:ext>
             </p:extLst>
           </p:nvPr>
@@ -24810,14 +24802,14 @@
                     <a:p>
                       <a:pPr algn="l" fontAlgn="b"/>
                       <a:r>
-                        <a:rPr lang="en-US" sz="2400" u="none" strike="noStrike">
+                        <a:rPr lang="en-US" sz="2400" u="none" strike="noStrike" dirty="0">
                           <a:effectLst/>
                           <a:latin typeface="+mj-lt"/>
                           <a:cs typeface="Times New Roman" panose="02020603050405020304" pitchFamily="18" charset="0"/>
                         </a:rPr>
                         <a:t>Infinity</a:t>
                       </a:r>
-                      <a:endParaRPr lang="en-US" sz="2400" b="0" i="0" u="none" strike="noStrike">
+                      <a:endParaRPr lang="en-US" sz="2400" b="0" i="0" u="none" strike="noStrike" dirty="0">
                         <a:solidFill>
                           <a:srgbClr val="000000"/>
                         </a:solidFill>
@@ -24864,14 +24856,14 @@
                     <a:p>
                       <a:pPr algn="l" fontAlgn="b"/>
                       <a:r>
-                        <a:rPr lang="en-US" sz="2400" u="none" strike="noStrike">
+                        <a:rPr lang="en-US" sz="2400" u="none" strike="noStrike" dirty="0">
                           <a:effectLst/>
                           <a:latin typeface="+mj-lt"/>
                           <a:cs typeface="Times New Roman" panose="02020603050405020304" pitchFamily="18" charset="0"/>
                         </a:rPr>
                         <a:t>Numeric overflow</a:t>
                       </a:r>
-                      <a:endParaRPr lang="en-US" sz="2400" b="0" i="0" u="none" strike="noStrike">
+                      <a:endParaRPr lang="en-US" sz="2400" b="0" i="0" u="none" strike="noStrike" dirty="0">
                         <a:solidFill>
                           <a:srgbClr val="000000"/>
                         </a:solidFill>
@@ -24890,12 +24882,79 @@
                     <a:p>
                       <a:pPr algn="l" fontAlgn="b"/>
                       <a:r>
-                        <a:rPr lang="en-US" sz="2400" u="none" strike="noStrike" dirty="0">
+                        <a:rPr lang="en-US" sz="2400" u="none" strike="noStrike" dirty="0" err="1" smtClean="0">
                           <a:effectLst/>
                           <a:latin typeface="+mj-lt"/>
                           <a:cs typeface="Times New Roman" panose="02020603050405020304" pitchFamily="18" charset="0"/>
                         </a:rPr>
-                        <a:t>-1.0*2^102 </a:t>
+                        <a:t>Nằm</a:t>
+                      </a:r>
+                      <a:r>
+                        <a:rPr lang="en-US" sz="2400" u="none" strike="noStrike" baseline="0" dirty="0" smtClean="0">
+                          <a:effectLst/>
+                          <a:latin typeface="+mj-lt"/>
+                          <a:cs typeface="Times New Roman" panose="02020603050405020304" pitchFamily="18" charset="0"/>
+                        </a:rPr>
+                        <a:t> </a:t>
+                      </a:r>
+                      <a:r>
+                        <a:rPr lang="en-US" sz="2400" u="none" strike="noStrike" baseline="0" dirty="0" err="1" smtClean="0">
+                          <a:effectLst/>
+                          <a:latin typeface="+mj-lt"/>
+                          <a:cs typeface="Times New Roman" panose="02020603050405020304" pitchFamily="18" charset="0"/>
+                        </a:rPr>
+                        <a:t>ngoài</a:t>
+                      </a:r>
+                      <a:r>
+                        <a:rPr lang="en-US" sz="2400" u="none" strike="noStrike" baseline="0" dirty="0" smtClean="0">
+                          <a:effectLst/>
+                          <a:latin typeface="+mj-lt"/>
+                          <a:cs typeface="Times New Roman" panose="02020603050405020304" pitchFamily="18" charset="0"/>
+                        </a:rPr>
+                        <a:t> </a:t>
+                      </a:r>
+                      <a:r>
+                        <a:rPr lang="en-US" sz="2400" u="none" strike="noStrike" baseline="0" dirty="0" err="1" smtClean="0">
+                          <a:effectLst/>
+                          <a:latin typeface="+mj-lt"/>
+                          <a:cs typeface="Times New Roman" panose="02020603050405020304" pitchFamily="18" charset="0"/>
+                        </a:rPr>
+                        <a:t>khoảng</a:t>
+                      </a:r>
+                      <a:r>
+                        <a:rPr lang="en-US" sz="2400" u="none" strike="noStrike" baseline="0" dirty="0" smtClean="0">
+                          <a:effectLst/>
+                          <a:latin typeface="+mj-lt"/>
+                          <a:cs typeface="Times New Roman" panose="02020603050405020304" pitchFamily="18" charset="0"/>
+                        </a:rPr>
+                        <a:t> </a:t>
+                      </a:r>
+                    </a:p>
+                    <a:p>
+                      <a:pPr algn="l" fontAlgn="b"/>
+                      <a:r>
+                        <a:rPr lang="en-US" sz="2400" u="none" strike="noStrike" baseline="0" dirty="0" err="1" smtClean="0">
+                          <a:effectLst/>
+                          <a:latin typeface="+mj-lt"/>
+                          <a:cs typeface="Times New Roman" panose="02020603050405020304" pitchFamily="18" charset="0"/>
+                        </a:rPr>
+                        <a:t>từ</a:t>
+                      </a:r>
+                      <a:r>
+                        <a:rPr lang="en-US" sz="2400" u="none" strike="noStrike" baseline="0" dirty="0" smtClean="0">
+                          <a:effectLst/>
+                          <a:latin typeface="+mj-lt"/>
+                          <a:cs typeface="Times New Roman" panose="02020603050405020304" pitchFamily="18" charset="0"/>
+                        </a:rPr>
+                        <a:t> </a:t>
+                      </a:r>
+                      <a:r>
+                        <a:rPr lang="en-US" sz="2400" u="none" strike="noStrike" dirty="0" smtClean="0">
+                          <a:effectLst/>
+                          <a:latin typeface="+mj-lt"/>
+                          <a:cs typeface="Times New Roman" panose="02020603050405020304" pitchFamily="18" charset="0"/>
+                        </a:rPr>
+                        <a:t>-1.0*2^1024 </a:t>
                       </a:r>
                       <a:r>
                         <a:rPr lang="en-US" sz="2400" u="none" strike="noStrike" dirty="0" err="1">
@@ -24911,7 +24970,15 @@
                           <a:latin typeface="+mj-lt"/>
                           <a:cs typeface="Times New Roman" panose="02020603050405020304" pitchFamily="18" charset="0"/>
                         </a:rPr>
-                        <a:t> 1.0*2^1022</a:t>
+                        <a:t> </a:t>
+                      </a:r>
+                      <a:r>
+                        <a:rPr lang="en-US" sz="2400" u="none" strike="noStrike" dirty="0" smtClean="0">
+                          <a:effectLst/>
+                          <a:latin typeface="+mj-lt"/>
+                          <a:cs typeface="Times New Roman" panose="02020603050405020304" pitchFamily="18" charset="0"/>
+                        </a:rPr>
+                        <a:t>1.0*2^1024</a:t>
                       </a:r>
                       <a:endParaRPr lang="en-US" sz="2400" b="0" i="0" u="none" strike="noStrike" dirty="0">
                         <a:solidFill>
@@ -24960,14 +25027,97 @@
                     <a:p>
                       <a:pPr algn="l" fontAlgn="b"/>
                       <a:r>
-                        <a:rPr lang="en-US" sz="2400" u="none" strike="noStrike">
+                        <a:rPr lang="en-US" sz="2400" u="none" strike="noStrike" dirty="0" err="1" smtClean="0">
                           <a:effectLst/>
                           <a:latin typeface="+mj-lt"/>
                           <a:cs typeface="Times New Roman" panose="02020603050405020304" pitchFamily="18" charset="0"/>
                         </a:rPr>
-                        <a:t>-1.0*2^-1022 đến 1.0*2^-1022</a:t>
+                        <a:t>Nằm</a:t>
                       </a:r>
-                      <a:endParaRPr lang="en-US" sz="2400" b="0" i="0" u="none" strike="noStrike">
+                      <a:r>
+                        <a:rPr lang="en-US" sz="2400" u="none" strike="noStrike" baseline="0" dirty="0" smtClean="0">
+                          <a:effectLst/>
+                          <a:latin typeface="+mj-lt"/>
+                          <a:cs typeface="Times New Roman" panose="02020603050405020304" pitchFamily="18" charset="0"/>
+                        </a:rPr>
+                        <a:t> </a:t>
+                      </a:r>
+                      <a:r>
+                        <a:rPr lang="en-US" sz="2400" u="none" strike="noStrike" baseline="0" dirty="0" err="1" smtClean="0">
+                          <a:effectLst/>
+                          <a:latin typeface="+mj-lt"/>
+                          <a:cs typeface="Times New Roman" panose="02020603050405020304" pitchFamily="18" charset="0"/>
+                        </a:rPr>
+                        <a:t>trong</a:t>
+                      </a:r>
+                      <a:r>
+                        <a:rPr lang="en-US" sz="2400" u="none" strike="noStrike" baseline="0" dirty="0" smtClean="0">
+                          <a:effectLst/>
+                          <a:latin typeface="+mj-lt"/>
+                          <a:cs typeface="Times New Roman" panose="02020603050405020304" pitchFamily="18" charset="0"/>
+                        </a:rPr>
+                        <a:t> </a:t>
+                      </a:r>
+                      <a:r>
+                        <a:rPr lang="en-US" sz="2400" u="none" strike="noStrike" baseline="0" dirty="0" err="1" smtClean="0">
+                          <a:effectLst/>
+                          <a:latin typeface="+mj-lt"/>
+                          <a:cs typeface="Times New Roman" panose="02020603050405020304" pitchFamily="18" charset="0"/>
+                        </a:rPr>
+                        <a:t>khoảng</a:t>
+                      </a:r>
+                      <a:r>
+                        <a:rPr lang="en-US" sz="2400" u="none" strike="noStrike" baseline="0" dirty="0" smtClean="0">
+                          <a:effectLst/>
+                          <a:latin typeface="+mj-lt"/>
+                          <a:cs typeface="Times New Roman" panose="02020603050405020304" pitchFamily="18" charset="0"/>
+                        </a:rPr>
+                        <a:t> </a:t>
+                      </a:r>
+                    </a:p>
+                    <a:p>
+                      <a:pPr algn="l" fontAlgn="b"/>
+                      <a:r>
+                        <a:rPr lang="en-US" sz="2400" u="none" strike="noStrike" dirty="0" err="1" smtClean="0">
+                          <a:effectLst/>
+                          <a:latin typeface="+mj-lt"/>
+                          <a:cs typeface="Times New Roman" panose="02020603050405020304" pitchFamily="18" charset="0"/>
+                        </a:rPr>
+                        <a:t>từ</a:t>
+                      </a:r>
+                      <a:r>
+                        <a:rPr lang="en-US" sz="2400" u="none" strike="noStrike" dirty="0" smtClean="0">
+                          <a:effectLst/>
+                          <a:latin typeface="+mj-lt"/>
+                          <a:cs typeface="Times New Roman" panose="02020603050405020304" pitchFamily="18" charset="0"/>
+                        </a:rPr>
+                        <a:t> -1.0*2</a:t>
+                      </a:r>
+                      <a:r>
+                        <a:rPr lang="en-US" sz="2400" u="none" strike="noStrike" dirty="0">
+                          <a:effectLst/>
+                          <a:latin typeface="+mj-lt"/>
+                          <a:cs typeface="Times New Roman" panose="02020603050405020304" pitchFamily="18" charset="0"/>
+                        </a:rPr>
+                        <a:t>^-1022 </a:t>
+                      </a:r>
+                      <a:r>
+                        <a:rPr lang="en-US" sz="2400" u="none" strike="noStrike" dirty="0" err="1">
+                          <a:effectLst/>
+                          <a:latin typeface="+mj-lt"/>
+                          <a:cs typeface="Times New Roman" panose="02020603050405020304" pitchFamily="18" charset="0"/>
+                        </a:rPr>
+                        <a:t>đến</a:t>
+                      </a:r>
+                      <a:r>
+                        <a:rPr lang="en-US" sz="2400" u="none" strike="noStrike" dirty="0">
+                          <a:effectLst/>
+                          <a:latin typeface="+mj-lt"/>
+                          <a:cs typeface="Times New Roman" panose="02020603050405020304" pitchFamily="18" charset="0"/>
+                        </a:rPr>
+                        <a:t> 1.0*2^-1022</a:t>
+                      </a:r>
+                      <a:endParaRPr lang="en-US" sz="2400" b="0" i="0" u="none" strike="noStrike" dirty="0">
                         <a:solidFill>
                           <a:srgbClr val="000000"/>
                         </a:solidFill>
@@ -25375,7 +25525,7 @@
     </p:spTree>
     <p:extLst>
       <p:ext uri="{BB962C8B-B14F-4D97-AF65-F5344CB8AC3E}">
-        <p14:creationId xmlns:p14="http://schemas.microsoft.com/office/powerpoint/2010/main" xmlns="" val="1750825173"/>
+        <p14:creationId xmlns:p14="http://schemas.microsoft.com/office/powerpoint/2010/main" val="1750825173"/>
       </p:ext>
     </p:extLst>
   </p:cSld>
@@ -25654,6 +25804,13 @@
   <p:transition>
     <p:fade/>
   </p:transition>
+  <p:timing>
+    <p:tnLst>
+      <p:par>
+        <p:cTn id="1" dur="indefinite" restart="never" nodeType="tmRoot"/>
+      </p:par>
+    </p:tnLst>
+  </p:timing>
 </p:sld>
 </file>
 
@@ -25755,7 +25912,7 @@
           <p:nvPr>
             <p:extLst>
               <p:ext uri="{D42A27DB-BD31-4B8C-83A1-F6EECF244321}">
-                <p14:modId xmlns:p14="http://schemas.microsoft.com/office/powerpoint/2010/main" xmlns="" val="3224575343"/>
+                <p14:modId xmlns:p14="http://schemas.microsoft.com/office/powerpoint/2010/main" val="3224575343"/>
               </p:ext>
             </p:extLst>
           </p:nvPr>
@@ -27245,7 +27402,7 @@
     </p:spTree>
     <p:extLst>
       <p:ext uri="{BB962C8B-B14F-4D97-AF65-F5344CB8AC3E}">
-        <p14:creationId xmlns:p14="http://schemas.microsoft.com/office/powerpoint/2010/main" xmlns="" val="3172706615"/>
+        <p14:creationId xmlns:p14="http://schemas.microsoft.com/office/powerpoint/2010/main" val="3172706615"/>
       </p:ext>
     </p:extLst>
   </p:cSld>
@@ -27341,13 +27498,7 @@
               <a:rPr lang="vi-VN" sz="3600" b="1" smtClean="0">
                 <a:latin typeface="Calibri" pitchFamily="34" charset="0"/>
               </a:rPr>
-              <a:t>vào </a:t>
-            </a:r>
-            <a:r>
-              <a:rPr lang="vi-VN" sz="3600" b="1" smtClean="0">
-                <a:latin typeface="Calibri" pitchFamily="34" charset="0"/>
-              </a:rPr>
-              <a:t>BE-PUM</a:t>
+              <a:t>vào BE-PUM</a:t>
             </a:r>
             <a:endParaRPr lang="vi-VN" sz="3600" b="1" dirty="0" smtClean="0">
               <a:latin typeface="Calibri" pitchFamily="34" charset="0"/>
@@ -27507,7 +27658,7 @@
     </p:spTree>
     <p:extLst>
       <p:ext uri="{BB962C8B-B14F-4D97-AF65-F5344CB8AC3E}">
-        <p14:creationId xmlns:p14="http://schemas.microsoft.com/office/powerpoint/2010/main" xmlns="" val="51709623"/>
+        <p14:creationId xmlns:p14="http://schemas.microsoft.com/office/powerpoint/2010/main" val="51709623"/>
       </p:ext>
     </p:extLst>
   </p:cSld>
@@ -27517,6 +27668,13 @@
   <p:transition>
     <p:fade/>
   </p:transition>
+  <p:timing>
+    <p:tnLst>
+      <p:par>
+        <p:cTn id="1" dur="indefinite" restart="never" nodeType="tmRoot"/>
+      </p:par>
+    </p:tnLst>
+  </p:timing>
 </p:sld>
 </file>
 
@@ -29510,7 +29668,7 @@
     </p:spTree>
     <p:extLst>
       <p:ext uri="{BB962C8B-B14F-4D97-AF65-F5344CB8AC3E}">
-        <p14:creationId xmlns:p14="http://schemas.microsoft.com/office/powerpoint/2010/main" xmlns="" val="1838113439"/>
+        <p14:creationId xmlns:p14="http://schemas.microsoft.com/office/powerpoint/2010/main" val="1838113439"/>
       </p:ext>
     </p:extLst>
   </p:cSld>
@@ -29520,6 +29678,13 @@
   <p:transition>
     <p:fade/>
   </p:transition>
+  <p:timing>
+    <p:tnLst>
+      <p:par>
+        <p:cTn id="1" dur="indefinite" restart="never" nodeType="tmRoot"/>
+      </p:par>
+    </p:tnLst>
+  </p:timing>
 </p:sld>
 </file>
 
@@ -29706,7 +29871,7 @@
     </p:spTree>
     <p:extLst>
       <p:ext uri="{BB962C8B-B14F-4D97-AF65-F5344CB8AC3E}">
-        <p14:creationId xmlns:p14="http://schemas.microsoft.com/office/powerpoint/2010/main" xmlns="" val="1994738228"/>
+        <p14:creationId xmlns:p14="http://schemas.microsoft.com/office/powerpoint/2010/main" val="1994738228"/>
       </p:ext>
     </p:extLst>
   </p:cSld>
@@ -29716,6 +29881,13 @@
   <p:transition>
     <p:fade/>
   </p:transition>
+  <p:timing>
+    <p:tnLst>
+      <p:par>
+        <p:cTn id="1" dur="indefinite" restart="never" nodeType="tmRoot"/>
+      </p:par>
+    </p:tnLst>
+  </p:timing>
 </p:sld>
 </file>
 
@@ -31759,11 +31931,7 @@
           <a:p>
             <a:r>
               <a:rPr lang="en-US" sz="2400" b="1" smtClean="0"/>
-              <a:t>Cách sắp xếp và lưu trữ bộ nhớ của </a:t>
-            </a:r>
-            <a:r>
-              <a:rPr lang="en-US" sz="2400" b="1" smtClean="0"/>
-              <a:t>structure</a:t>
+              <a:t>Cách sắp xếp và lưu trữ bộ nhớ của structure</a:t>
             </a:r>
             <a:endParaRPr lang="en-US" sz="2400" b="1"/>
           </a:p>
@@ -31892,7 +32060,7 @@
     </p:spTree>
     <p:extLst>
       <p:ext uri="{BB962C8B-B14F-4D97-AF65-F5344CB8AC3E}">
-        <p14:creationId xmlns:p14="http://schemas.microsoft.com/office/powerpoint/2010/main" xmlns="" val="923323200"/>
+        <p14:creationId xmlns:p14="http://schemas.microsoft.com/office/powerpoint/2010/main" val="923323200"/>
       </p:ext>
     </p:extLst>
   </p:cSld>
@@ -32544,7 +32712,7 @@
     </p:spTree>
     <p:extLst>
       <p:ext uri="{BB962C8B-B14F-4D97-AF65-F5344CB8AC3E}">
-        <p14:creationId xmlns:p14="http://schemas.microsoft.com/office/powerpoint/2010/main" xmlns="" val="3760410251"/>
+        <p14:creationId xmlns:p14="http://schemas.microsoft.com/office/powerpoint/2010/main" val="3760410251"/>
       </p:ext>
     </p:extLst>
   </p:cSld>
@@ -32930,7 +33098,7 @@
     </p:spTree>
     <p:extLst>
       <p:ext uri="{BB962C8B-B14F-4D97-AF65-F5344CB8AC3E}">
-        <p14:creationId xmlns:p14="http://schemas.microsoft.com/office/powerpoint/2010/main" xmlns="" val="1418128630"/>
+        <p14:creationId xmlns:p14="http://schemas.microsoft.com/office/powerpoint/2010/main" val="1418128630"/>
       </p:ext>
     </p:extLst>
   </p:cSld>
@@ -33156,7 +33324,7 @@
     </p:spTree>
     <p:extLst>
       <p:ext uri="{BB962C8B-B14F-4D97-AF65-F5344CB8AC3E}">
-        <p14:creationId xmlns:p14="http://schemas.microsoft.com/office/powerpoint/2010/main" xmlns="" val="119092"/>
+        <p14:creationId xmlns:p14="http://schemas.microsoft.com/office/powerpoint/2010/main" val="119092"/>
       </p:ext>
     </p:extLst>
   </p:cSld>
@@ -33245,21 +33413,7 @@
                 <a:latin typeface="Calibri" pitchFamily="34" charset="0"/>
                 <a:cs typeface="Times New Roman" panose="02020603050405020304" pitchFamily="18" charset="0"/>
               </a:rPr>
-              <a:t>Simulation </a:t>
-            </a:r>
-            <a:r>
-              <a:rPr lang="en-GB" sz="3200" b="1" smtClean="0">
-                <a:latin typeface="Calibri" pitchFamily="34" charset="0"/>
-                <a:cs typeface="Times New Roman" panose="02020603050405020304" pitchFamily="18" charset="0"/>
-              </a:rPr>
-              <a:t>Assembly </a:t>
-            </a:r>
-            <a:r>
-              <a:rPr lang="en-GB" sz="3200" b="1" smtClean="0">
-                <a:latin typeface="Calibri" pitchFamily="34" charset="0"/>
-                <a:cs typeface="Times New Roman" panose="02020603050405020304" pitchFamily="18" charset="0"/>
-              </a:rPr>
-              <a:t>Class</a:t>
+              <a:t>Simulation Assembly Class</a:t>
             </a:r>
             <a:endParaRPr lang="en-GB" sz="3200" b="1" dirty="0">
               <a:latin typeface="Calibri" pitchFamily="34" charset="0"/>
@@ -33371,7 +33525,7 @@
     </p:spTree>
     <p:extLst>
       <p:ext uri="{BB962C8B-B14F-4D97-AF65-F5344CB8AC3E}">
-        <p14:creationId xmlns:p14="http://schemas.microsoft.com/office/powerpoint/2010/main" xmlns="" val="3666409431"/>
+        <p14:creationId xmlns:p14="http://schemas.microsoft.com/office/powerpoint/2010/main" val="3666409431"/>
       </p:ext>
     </p:extLst>
   </p:cSld>
@@ -33381,6 +33535,13 @@
   <p:transition>
     <p:fade/>
   </p:transition>
+  <p:timing>
+    <p:tnLst>
+      <p:par>
+        <p:cTn id="1" dur="indefinite" restart="never" nodeType="tmRoot"/>
+      </p:par>
+    </p:tnLst>
+  </p:timing>
 </p:sld>
 </file>
 
@@ -33575,7 +33736,7 @@
     </p:spTree>
     <p:extLst>
       <p:ext uri="{BB962C8B-B14F-4D97-AF65-F5344CB8AC3E}">
-        <p14:creationId xmlns:p14="http://schemas.microsoft.com/office/powerpoint/2010/main" xmlns="" val="3996168820"/>
+        <p14:creationId xmlns:p14="http://schemas.microsoft.com/office/powerpoint/2010/main" val="3996168820"/>
       </p:ext>
     </p:extLst>
   </p:cSld>
@@ -33585,6 +33746,13 @@
   <p:transition>
     <p:fade/>
   </p:transition>
+  <p:timing>
+    <p:tnLst>
+      <p:par>
+        <p:cTn id="1" dur="indefinite" restart="never" nodeType="tmRoot"/>
+      </p:par>
+    </p:tnLst>
+  </p:timing>
 </p:sld>
 </file>
 
@@ -34228,7 +34396,7 @@
     </p:spTree>
     <p:extLst>
       <p:ext uri="{BB962C8B-B14F-4D97-AF65-F5344CB8AC3E}">
-        <p14:creationId xmlns:p14="http://schemas.microsoft.com/office/powerpoint/2010/main" xmlns="" val="3756422615"/>
+        <p14:creationId xmlns:p14="http://schemas.microsoft.com/office/powerpoint/2010/main" val="3756422615"/>
       </p:ext>
     </p:extLst>
   </p:cSld>
@@ -34238,6 +34406,13 @@
   <p:transition>
     <p:fade/>
   </p:transition>
+  <p:timing>
+    <p:tnLst>
+      <p:par>
+        <p:cTn id="1" dur="indefinite" restart="never" nodeType="tmRoot"/>
+      </p:par>
+    </p:tnLst>
+  </p:timing>
 </p:sld>
 </file>
 
@@ -34432,7 +34607,7 @@
     </p:spTree>
     <p:extLst>
       <p:ext uri="{BB962C8B-B14F-4D97-AF65-F5344CB8AC3E}">
-        <p14:creationId xmlns:p14="http://schemas.microsoft.com/office/powerpoint/2010/main" xmlns="" val="1349470451"/>
+        <p14:creationId xmlns:p14="http://schemas.microsoft.com/office/powerpoint/2010/main" val="1349470451"/>
       </p:ext>
     </p:extLst>
   </p:cSld>
@@ -34442,6 +34617,13 @@
   <p:transition>
     <p:fade/>
   </p:transition>
+  <p:timing>
+    <p:tnLst>
+      <p:par>
+        <p:cTn id="1" dur="indefinite" restart="never" nodeType="tmRoot"/>
+      </p:par>
+    </p:tnLst>
+  </p:timing>
 </p:sld>
 </file>
 
@@ -34648,7 +34830,7 @@
     </p:spTree>
     <p:extLst>
       <p:ext uri="{BB962C8B-B14F-4D97-AF65-F5344CB8AC3E}">
-        <p14:creationId xmlns:p14="http://schemas.microsoft.com/office/powerpoint/2010/main" xmlns="" val="3802103006"/>
+        <p14:creationId xmlns:p14="http://schemas.microsoft.com/office/powerpoint/2010/main" val="3802103006"/>
       </p:ext>
     </p:extLst>
   </p:cSld>
@@ -34867,7 +35049,7 @@
     </p:spTree>
     <p:extLst>
       <p:ext uri="{BB962C8B-B14F-4D97-AF65-F5344CB8AC3E}">
-        <p14:creationId xmlns:p14="http://schemas.microsoft.com/office/powerpoint/2010/main" xmlns="" val="3660181649"/>
+        <p14:creationId xmlns:p14="http://schemas.microsoft.com/office/powerpoint/2010/main" val="3660181649"/>
       </p:ext>
     </p:extLst>
   </p:cSld>
@@ -34877,6 +35059,13 @@
   <p:transition>
     <p:fade/>
   </p:transition>
+  <p:timing>
+    <p:tnLst>
+      <p:par>
+        <p:cTn id="1" dur="indefinite" restart="never" nodeType="tmRoot"/>
+      </p:par>
+    </p:tnLst>
+  </p:timing>
 </p:sld>
 </file>
 
@@ -35075,7 +35264,7 @@
     </p:spTree>
     <p:extLst>
       <p:ext uri="{BB962C8B-B14F-4D97-AF65-F5344CB8AC3E}">
-        <p14:creationId xmlns:p14="http://schemas.microsoft.com/office/powerpoint/2010/main" xmlns="" val="3945339837"/>
+        <p14:creationId xmlns:p14="http://schemas.microsoft.com/office/powerpoint/2010/main" val="3945339837"/>
       </p:ext>
     </p:extLst>
   </p:cSld>
@@ -35407,7 +35596,7 @@
     </p:spTree>
     <p:extLst>
       <p:ext uri="{BB962C8B-B14F-4D97-AF65-F5344CB8AC3E}">
-        <p14:creationId xmlns:p14="http://schemas.microsoft.com/office/powerpoint/2010/main" xmlns="" val="777587646"/>
+        <p14:creationId xmlns:p14="http://schemas.microsoft.com/office/powerpoint/2010/main" val="777587646"/>
       </p:ext>
     </p:extLst>
   </p:cSld>
@@ -35417,6 +35606,13 @@
   <p:transition>
     <p:fade/>
   </p:transition>
+  <p:timing>
+    <p:tnLst>
+      <p:par>
+        <p:cTn id="1" dur="indefinite" restart="never" nodeType="tmRoot"/>
+      </p:par>
+    </p:tnLst>
+  </p:timing>
 </p:sld>
 </file>
 
@@ -35684,7 +35880,7 @@
     </p:spTree>
     <p:extLst>
       <p:ext uri="{BB962C8B-B14F-4D97-AF65-F5344CB8AC3E}">
-        <p14:creationId xmlns:p14="http://schemas.microsoft.com/office/powerpoint/2010/main" xmlns="" val="2834202862"/>
+        <p14:creationId xmlns:p14="http://schemas.microsoft.com/office/powerpoint/2010/main" val="2834202862"/>
       </p:ext>
     </p:extLst>
   </p:cSld>
@@ -35694,6 +35890,13 @@
   <p:transition>
     <p:fade/>
   </p:transition>
+  <p:timing>
+    <p:tnLst>
+      <p:par>
+        <p:cTn id="1" dur="indefinite" restart="never" nodeType="tmRoot"/>
+      </p:par>
+    </p:tnLst>
+  </p:timing>
 </p:sld>
 </file>
 
@@ -36073,7 +36276,7 @@
     </p:spTree>
     <p:extLst>
       <p:ext uri="{BB962C8B-B14F-4D97-AF65-F5344CB8AC3E}">
-        <p14:creationId xmlns:p14="http://schemas.microsoft.com/office/powerpoint/2010/main" xmlns="" val="4052613312"/>
+        <p14:creationId xmlns:p14="http://schemas.microsoft.com/office/powerpoint/2010/main" val="4052613312"/>
       </p:ext>
     </p:extLst>
   </p:cSld>
@@ -36536,7 +36739,7 @@
     </p:spTree>
     <p:extLst>
       <p:ext uri="{BB962C8B-B14F-4D97-AF65-F5344CB8AC3E}">
-        <p14:creationId xmlns:p14="http://schemas.microsoft.com/office/powerpoint/2010/main" xmlns="" val="3999561858"/>
+        <p14:creationId xmlns:p14="http://schemas.microsoft.com/office/powerpoint/2010/main" val="3999561858"/>
       </p:ext>
     </p:extLst>
   </p:cSld>
@@ -36627,11 +36830,7 @@
             </a:r>
             <a:r>
               <a:rPr lang="en-US" smtClean="0"/>
-              <a:t> </a:t>
-            </a:r>
-            <a:r>
-              <a:rPr lang="en-US" smtClean="0"/>
-              <a:t>dựng </a:t>
+              <a:t> dựng </a:t>
             </a:r>
             <a:r>
               <a:rPr lang="en-US" dirty="0" smtClean="0"/>
@@ -36729,7 +36928,7 @@
     </p:spTree>
     <p:extLst>
       <p:ext uri="{BB962C8B-B14F-4D97-AF65-F5344CB8AC3E}">
-        <p14:creationId xmlns:p14="http://schemas.microsoft.com/office/powerpoint/2010/main" xmlns="" val="3115759560"/>
+        <p14:creationId xmlns:p14="http://schemas.microsoft.com/office/powerpoint/2010/main" val="3115759560"/>
       </p:ext>
     </p:extLst>
   </p:cSld>
@@ -36739,6 +36938,13 @@
   <p:transition>
     <p:fade/>
   </p:transition>
+  <p:timing>
+    <p:tnLst>
+      <p:par>
+        <p:cTn id="1" dur="indefinite" restart="never" nodeType="tmRoot"/>
+      </p:par>
+    </p:tnLst>
+  </p:timing>
 </p:sld>
 </file>
 
@@ -36813,19 +37019,7 @@
             </a:r>
             <a:r>
               <a:rPr lang="en-US" smtClean="0"/>
-              <a:t> </a:t>
-            </a:r>
-            <a:r>
-              <a:rPr lang="en-US" smtClean="0"/>
-              <a:t>dựng</a:t>
-            </a:r>
-            <a:r>
-              <a:rPr lang="en-US" smtClean="0"/>
-              <a:t> </a:t>
-            </a:r>
-            <a:r>
-              <a:rPr lang="en-US" smtClean="0"/>
-              <a:t>(14</a:t>
+              <a:t> dựng (14</a:t>
             </a:r>
             <a:r>
               <a:rPr lang="en-US" dirty="0" smtClean="0"/>
@@ -37033,7 +37227,7 @@
     </p:spTree>
     <p:extLst>
       <p:ext uri="{BB962C8B-B14F-4D97-AF65-F5344CB8AC3E}">
-        <p14:creationId xmlns:p14="http://schemas.microsoft.com/office/powerpoint/2010/main" xmlns="" val="1072122832"/>
+        <p14:creationId xmlns:p14="http://schemas.microsoft.com/office/powerpoint/2010/main" val="1072122832"/>
       </p:ext>
     </p:extLst>
   </p:cSld>
@@ -37043,6 +37237,13 @@
   <p:transition>
     <p:fade/>
   </p:transition>
+  <p:timing>
+    <p:tnLst>
+      <p:par>
+        <p:cTn id="1" dur="indefinite" restart="never" nodeType="tmRoot"/>
+      </p:par>
+    </p:tnLst>
+  </p:timing>
 </p:sld>
 </file>
 
@@ -37857,7 +38058,7 @@
     </p:spTree>
     <p:extLst>
       <p:ext uri="{BB962C8B-B14F-4D97-AF65-F5344CB8AC3E}">
-        <p14:creationId xmlns:p14="http://schemas.microsoft.com/office/powerpoint/2010/main" xmlns="" val="802189261"/>
+        <p14:creationId xmlns:p14="http://schemas.microsoft.com/office/powerpoint/2010/main" val="802189261"/>
       </p:ext>
     </p:extLst>
   </p:cSld>
@@ -37867,6 +38068,13 @@
   <p:transition>
     <p:fade/>
   </p:transition>
+  <p:timing>
+    <p:tnLst>
+      <p:par>
+        <p:cTn id="1" dur="indefinite" restart="never" nodeType="tmRoot"/>
+      </p:par>
+    </p:tnLst>
+  </p:timing>
 </p:sld>
 </file>
 
@@ -37941,11 +38149,7 @@
             </a:r>
             <a:r>
               <a:rPr lang="en-US" smtClean="0"/>
-              <a:t> </a:t>
-            </a:r>
-            <a:r>
-              <a:rPr lang="en-US" smtClean="0"/>
-              <a:t>dựng </a:t>
+              <a:t> dựng </a:t>
             </a:r>
             <a:r>
               <a:rPr lang="en-US" dirty="0" smtClean="0"/>
@@ -38817,7 +39021,7 @@
     </p:spTree>
     <p:extLst>
       <p:ext uri="{BB962C8B-B14F-4D97-AF65-F5344CB8AC3E}">
-        <p14:creationId xmlns:p14="http://schemas.microsoft.com/office/powerpoint/2010/main" xmlns="" val="1559863298"/>
+        <p14:creationId xmlns:p14="http://schemas.microsoft.com/office/powerpoint/2010/main" val="1559863298"/>
       </p:ext>
     </p:extLst>
   </p:cSld>
@@ -38827,6 +39031,13 @@
   <p:transition>
     <p:fade/>
   </p:transition>
+  <p:timing>
+    <p:tnLst>
+      <p:par>
+        <p:cTn id="1" dur="indefinite" restart="never" nodeType="tmRoot"/>
+      </p:par>
+    </p:tnLst>
+  </p:timing>
 </p:sld>
 </file>
 
@@ -39498,7 +39709,7 @@
     </p:spTree>
     <p:extLst>
       <p:ext uri="{BB962C8B-B14F-4D97-AF65-F5344CB8AC3E}">
-        <p14:creationId xmlns:p14="http://schemas.microsoft.com/office/powerpoint/2010/main" xmlns="" val="3760410251"/>
+        <p14:creationId xmlns:p14="http://schemas.microsoft.com/office/powerpoint/2010/main" val="3760410251"/>
       </p:ext>
     </p:extLst>
   </p:cSld>
@@ -39670,7 +39881,7 @@
     </p:spTree>
     <p:extLst>
       <p:ext uri="{BB962C8B-B14F-4D97-AF65-F5344CB8AC3E}">
-        <p14:creationId xmlns:p14="http://schemas.microsoft.com/office/powerpoint/2010/main" xmlns="" val="343456395"/>
+        <p14:creationId xmlns:p14="http://schemas.microsoft.com/office/powerpoint/2010/main" val="343456395"/>
       </p:ext>
     </p:extLst>
   </p:cSld>
@@ -39680,6 +39891,13 @@
   <p:transition>
     <p:fade/>
   </p:transition>
+  <p:timing>
+    <p:tnLst>
+      <p:par>
+        <p:cTn id="1" dur="indefinite" restart="never" nodeType="tmRoot"/>
+      </p:par>
+    </p:tnLst>
+  </p:timing>
 </p:sld>
 </file>
 
@@ -39914,27 +40132,7 @@
                 <a:latin typeface="+mj-lt"/>
                 <a:cs typeface="Times New Roman" panose="02020603050405020304" pitchFamily="18" charset="0"/>
               </a:rPr>
-              <a:t>nghiệm</a:t>
-            </a:r>
-            <a:r>
-              <a:rPr lang="en-GB" sz="2400" i="1" smtClean="0">
-                <a:solidFill>
-                  <a:srgbClr val="000000"/>
-                </a:solidFill>
-                <a:latin typeface="+mj-lt"/>
-                <a:cs typeface="Times New Roman" panose="02020603050405020304" pitchFamily="18" charset="0"/>
-              </a:rPr>
-              <a:t> </a:t>
-            </a:r>
-            <a:r>
-              <a:rPr lang="en-GB" sz="2400" i="1" smtClean="0">
-                <a:solidFill>
-                  <a:srgbClr val="000000"/>
-                </a:solidFill>
-                <a:latin typeface="+mj-lt"/>
-                <a:cs typeface="Times New Roman" panose="02020603050405020304" pitchFamily="18" charset="0"/>
-              </a:rPr>
-              <a:t>trên</a:t>
+              <a:t>nghiệm trên</a:t>
             </a:r>
           </a:p>
           <a:p>
@@ -40115,7 +40313,7 @@
     </p:spTree>
     <p:extLst>
       <p:ext uri="{BB962C8B-B14F-4D97-AF65-F5344CB8AC3E}">
-        <p14:creationId xmlns:p14="http://schemas.microsoft.com/office/powerpoint/2010/main" xmlns="" val="2575571669"/>
+        <p14:creationId xmlns:p14="http://schemas.microsoft.com/office/powerpoint/2010/main" val="2575571669"/>
       </p:ext>
     </p:extLst>
   </p:cSld>
@@ -40125,6 +40323,13 @@
   <p:transition>
     <p:fade/>
   </p:transition>
+  <p:timing>
+    <p:tnLst>
+      <p:par>
+        <p:cTn id="1" dur="indefinite" restart="never" nodeType="tmRoot"/>
+      </p:par>
+    </p:tnLst>
+  </p:timing>
 </p:sld>
 </file>
 
@@ -40378,27 +40583,7 @@
                 <a:latin typeface="+mj-lt"/>
                 <a:cs typeface="Times New Roman" panose="02020603050405020304" pitchFamily="18" charset="0"/>
               </a:rPr>
-              <a:t>nghiệm</a:t>
-            </a:r>
-            <a:r>
-              <a:rPr lang="en-GB" sz="2400" i="1" smtClean="0">
-                <a:solidFill>
-                  <a:srgbClr val="000000"/>
-                </a:solidFill>
-                <a:latin typeface="+mj-lt"/>
-                <a:cs typeface="Times New Roman" panose="02020603050405020304" pitchFamily="18" charset="0"/>
-              </a:rPr>
-              <a:t> </a:t>
-            </a:r>
-            <a:r>
-              <a:rPr lang="en-GB" sz="2400" i="1" smtClean="0">
-                <a:solidFill>
-                  <a:srgbClr val="000000"/>
-                </a:solidFill>
-                <a:latin typeface="+mj-lt"/>
-                <a:cs typeface="Times New Roman" panose="02020603050405020304" pitchFamily="18" charset="0"/>
-              </a:rPr>
-              <a:t>trên</a:t>
+              <a:t>nghiệm trên</a:t>
             </a:r>
           </a:p>
           <a:p>
@@ -40579,7 +40764,7 @@
     </p:spTree>
     <p:extLst>
       <p:ext uri="{BB962C8B-B14F-4D97-AF65-F5344CB8AC3E}">
-        <p14:creationId xmlns:p14="http://schemas.microsoft.com/office/powerpoint/2010/main" xmlns="" val="2563724378"/>
+        <p14:creationId xmlns:p14="http://schemas.microsoft.com/office/powerpoint/2010/main" val="2563724378"/>
       </p:ext>
     </p:extLst>
   </p:cSld>
@@ -40589,6 +40774,13 @@
   <p:transition>
     <p:fade/>
   </p:transition>
+  <p:timing>
+    <p:tnLst>
+      <p:par>
+        <p:cTn id="1" dur="indefinite" restart="never" nodeType="tmRoot"/>
+      </p:par>
+    </p:tnLst>
+  </p:timing>
 </p:sld>
 </file>
 
@@ -40742,7 +40934,7 @@
     </p:spTree>
     <p:extLst>
       <p:ext uri="{BB962C8B-B14F-4D97-AF65-F5344CB8AC3E}">
-        <p14:creationId xmlns:p14="http://schemas.microsoft.com/office/powerpoint/2010/main" xmlns="" val="3431728384"/>
+        <p14:creationId xmlns:p14="http://schemas.microsoft.com/office/powerpoint/2010/main" val="3431728384"/>
       </p:ext>
     </p:extLst>
   </p:cSld>
@@ -40752,6 +40944,13 @@
   <p:transition>
     <p:fade/>
   </p:transition>
+  <p:timing>
+    <p:tnLst>
+      <p:par>
+        <p:cTn id="1" dur="indefinite" restart="never" nodeType="tmRoot"/>
+      </p:par>
+    </p:tnLst>
+  </p:timing>
 </p:sld>
 </file>
 
@@ -41387,7 +41586,7 @@
     </p:spTree>
     <p:extLst>
       <p:ext uri="{BB962C8B-B14F-4D97-AF65-F5344CB8AC3E}">
-        <p14:creationId xmlns:p14="http://schemas.microsoft.com/office/powerpoint/2010/main" xmlns="" val="3760410251"/>
+        <p14:creationId xmlns:p14="http://schemas.microsoft.com/office/powerpoint/2010/main" val="3760410251"/>
       </p:ext>
     </p:extLst>
   </p:cSld>
@@ -41915,7 +42114,7 @@
     </p:spTree>
     <p:extLst>
       <p:ext uri="{BB962C8B-B14F-4D97-AF65-F5344CB8AC3E}">
-        <p14:creationId xmlns:p14="http://schemas.microsoft.com/office/powerpoint/2010/main" xmlns="" val="3137303105"/>
+        <p14:creationId xmlns:p14="http://schemas.microsoft.com/office/powerpoint/2010/main" val="3137303105"/>
       </p:ext>
     </p:extLst>
   </p:cSld>
@@ -41925,6 +42124,13 @@
   <p:transition>
     <p:fade/>
   </p:transition>
+  <p:timing>
+    <p:tnLst>
+      <p:par>
+        <p:cTn id="1" dur="indefinite" restart="never" nodeType="tmRoot"/>
+      </p:par>
+    </p:tnLst>
+  </p:timing>
 </p:sld>
 </file>
 
@@ -42216,17 +42422,7 @@
                 <a:latin typeface="Calibri" pitchFamily="34" charset="0"/>
                 <a:cs typeface="Times New Roman" panose="02020603050405020304" pitchFamily="18" charset="0"/>
               </a:rPr>
-              <a:t>ít </a:t>
-            </a:r>
-            <a:r>
-              <a:rPr lang="vi-VN" sz="3200" smtClean="0">
-                <a:solidFill>
-                  <a:srgbClr val="000000"/>
-                </a:solidFill>
-                <a:latin typeface="Calibri" pitchFamily="34" charset="0"/>
-                <a:cs typeface="Times New Roman" panose="02020603050405020304" pitchFamily="18" charset="0"/>
-              </a:rPr>
-              <a:t>ỏi.</a:t>
+              <a:t>ít ỏi.</a:t>
             </a:r>
             <a:endParaRPr lang="en-US" sz="3200" smtClean="0">
               <a:solidFill>
@@ -42292,17 +42488,7 @@
                 <a:latin typeface="Calibri" pitchFamily="34" charset="0"/>
                 <a:cs typeface="Times New Roman" panose="02020603050405020304" pitchFamily="18" charset="0"/>
               </a:rPr>
-              <a:t>hàm</a:t>
-            </a:r>
-            <a:r>
-              <a:rPr lang="vi-VN" sz="3200" smtClean="0">
-                <a:solidFill>
-                  <a:srgbClr val="000000"/>
-                </a:solidFill>
-                <a:latin typeface="Calibri" pitchFamily="34" charset="0"/>
-                <a:cs typeface="Times New Roman" panose="02020603050405020304" pitchFamily="18" charset="0"/>
-              </a:rPr>
-              <a:t>.</a:t>
+              <a:t>hàm.</a:t>
             </a:r>
             <a:endParaRPr lang="en-GB" sz="3200" dirty="0">
               <a:latin typeface="Calibri" pitchFamily="34" charset="0"/>
@@ -42342,7 +42528,7 @@
     </p:spTree>
     <p:extLst>
       <p:ext uri="{BB962C8B-B14F-4D97-AF65-F5344CB8AC3E}">
-        <p14:creationId xmlns:p14="http://schemas.microsoft.com/office/powerpoint/2010/main" xmlns="" val="2408020989"/>
+        <p14:creationId xmlns:p14="http://schemas.microsoft.com/office/powerpoint/2010/main" val="2408020989"/>
       </p:ext>
     </p:extLst>
   </p:cSld>
@@ -42393,10 +42579,10 @@
           <a:lstStyle/>
           <a:p>
             <a:r>
-              <a:rPr lang="en-US" smtClean="0"/>
+              <a:rPr lang="en-US" dirty="0" smtClean="0"/>
               <a:t>CẢM ƠN CÁC THẦY ĐÃ LẮNG NGHE</a:t>
             </a:r>
-            <a:endParaRPr lang="en-US"/>
+            <a:endParaRPr lang="en-US" dirty="0"/>
           </a:p>
         </p:txBody>
       </p:sp>
@@ -42422,7 +42608,7 @@
           </a:bodyPr>
           <a:lstStyle/>
           <a:p>
-            <a:endParaRPr lang="en-US" sz="2000" smtClean="0"/>
+            <a:endParaRPr lang="en-US" sz="2000" dirty="0" smtClean="0"/>
           </a:p>
           <a:p>
             <a:r>
@@ -42746,7 +42932,7 @@
     </p:spTree>
     <p:extLst>
       <p:ext uri="{BB962C8B-B14F-4D97-AF65-F5344CB8AC3E}">
-        <p14:creationId xmlns:p14="http://schemas.microsoft.com/office/powerpoint/2010/main" xmlns="" val="2974430686"/>
+        <p14:creationId xmlns:p14="http://schemas.microsoft.com/office/powerpoint/2010/main" val="2974430686"/>
       </p:ext>
     </p:extLst>
   </p:cSld>
@@ -42756,6 +42942,13 @@
   <p:transition>
     <p:fade/>
   </p:transition>
+  <p:timing>
+    <p:tnLst>
+      <p:par>
+        <p:cTn id="1" dur="indefinite" restart="never" nodeType="tmRoot"/>
+      </p:par>
+    </p:tnLst>
+  </p:timing>
 </p:sld>
 </file>
 
@@ -43368,7 +43561,7 @@
     </p:spTree>
     <p:extLst>
       <p:ext uri="{BB962C8B-B14F-4D97-AF65-F5344CB8AC3E}">
-        <p14:creationId xmlns:p14="http://schemas.microsoft.com/office/powerpoint/2010/main" xmlns="" val="802189261"/>
+        <p14:creationId xmlns:p14="http://schemas.microsoft.com/office/powerpoint/2010/main" val="802189261"/>
       </p:ext>
     </p:extLst>
   </p:cSld>
@@ -43378,6 +43571,13 @@
   <p:transition>
     <p:fade/>
   </p:transition>
+  <p:timing>
+    <p:tnLst>
+      <p:par>
+        <p:cTn id="1" dur="indefinite" restart="never" nodeType="tmRoot"/>
+      </p:par>
+    </p:tnLst>
+  </p:timing>
 </p:sld>
 </file>
 
@@ -43464,17 +43664,7 @@
                 <a:latin typeface="Calibri" panose="020F0502020204030204" pitchFamily="34" charset="0"/>
                 <a:cs typeface="Times New Roman" panose="02020603050405020304" pitchFamily="18" charset="0"/>
               </a:rPr>
-              <a:t>mạnh </a:t>
-            </a:r>
-            <a:r>
-              <a:rPr lang="vi-VN" sz="2800" smtClean="0">
-                <a:solidFill>
-                  <a:srgbClr val="000000"/>
-                </a:solidFill>
-                <a:latin typeface="Calibri" panose="020F0502020204030204" pitchFamily="34" charset="0"/>
-                <a:cs typeface="Times New Roman" panose="02020603050405020304" pitchFamily="18" charset="0"/>
-              </a:rPr>
-              <a:t>của </a:t>
+              <a:t>mạnh của </a:t>
             </a:r>
             <a:r>
               <a:rPr lang="vi-VN" sz="2800" dirty="0">
@@ -43740,27 +43930,7 @@
                 <a:latin typeface="Calibri" panose="020F0502020204030204" pitchFamily="34" charset="0"/>
                 <a:cs typeface="Times New Roman" panose="02020603050405020304" pitchFamily="18" charset="0"/>
               </a:rPr>
-              <a:t>của chương trình là </a:t>
-            </a:r>
-            <a:r>
-              <a:rPr lang="vi-VN" sz="2800" smtClean="0">
-                <a:solidFill>
-                  <a:srgbClr val="000000"/>
-                </a:solidFill>
-                <a:latin typeface="Calibri" panose="020F0502020204030204" pitchFamily="34" charset="0"/>
-                <a:cs typeface="Times New Roman" panose="02020603050405020304" pitchFamily="18" charset="0"/>
-              </a:rPr>
-              <a:t>gì</a:t>
-            </a:r>
-            <a:r>
-              <a:rPr lang="vi-VN" sz="2800" smtClean="0">
-                <a:solidFill>
-                  <a:srgbClr val="000000"/>
-                </a:solidFill>
-                <a:latin typeface="Calibri" panose="020F0502020204030204" pitchFamily="34" charset="0"/>
-                <a:cs typeface="Times New Roman" panose="02020603050405020304" pitchFamily="18" charset="0"/>
-              </a:rPr>
-              <a:t>.</a:t>
+              <a:t>của chương trình là gì.</a:t>
             </a:r>
             <a:endParaRPr lang="en-US" sz="2800" smtClean="0">
               <a:solidFill>
@@ -43805,7 +43975,17 @@
                 <a:latin typeface="Calibri" panose="020F0502020204030204" pitchFamily="34" charset="0"/>
                 <a:cs typeface="Times New Roman" panose="02020603050405020304" pitchFamily="18" charset="0"/>
               </a:rPr>
-              <a:t>iải </a:t>
+              <a:t>iải quyết được các cách thức làm rối mã như</a:t>
+            </a:r>
+            <a:r>
+              <a:rPr lang="en-ZA" sz="2800" smtClean="0">
+                <a:solidFill>
+                  <a:srgbClr val="000000"/>
+                </a:solidFill>
+                <a:latin typeface="Calibri" panose="020F0502020204030204" pitchFamily="34" charset="0"/>
+                <a:cs typeface="Times New Roman" panose="02020603050405020304" pitchFamily="18" charset="0"/>
+              </a:rPr>
+              <a:t> </a:t>
             </a:r>
             <a:r>
               <a:rPr lang="vi-VN" sz="2800" smtClean="0">
@@ -43815,7 +43995,7 @@
                 <a:latin typeface="Calibri" panose="020F0502020204030204" pitchFamily="34" charset="0"/>
                 <a:cs typeface="Times New Roman" panose="02020603050405020304" pitchFamily="18" charset="0"/>
               </a:rPr>
-              <a:t>quyết được các cách thức làm rối mã như</a:t>
+              <a:t>nhảy gián tiếp, tự thay đổi m</a:t>
             </a:r>
             <a:r>
               <a:rPr lang="en-ZA" sz="2800" smtClean="0">
@@ -43825,37 +44005,7 @@
                 <a:latin typeface="Calibri" panose="020F0502020204030204" pitchFamily="34" charset="0"/>
                 <a:cs typeface="Times New Roman" panose="02020603050405020304" pitchFamily="18" charset="0"/>
               </a:rPr>
-              <a:t> </a:t>
-            </a:r>
-            <a:r>
-              <a:rPr lang="vi-VN" sz="2800" smtClean="0">
-                <a:solidFill>
-                  <a:srgbClr val="000000"/>
-                </a:solidFill>
-                <a:latin typeface="Calibri" panose="020F0502020204030204" pitchFamily="34" charset="0"/>
-                <a:cs typeface="Times New Roman" panose="02020603050405020304" pitchFamily="18" charset="0"/>
-              </a:rPr>
-              <a:t>nhảy gián tiếp, tự thay đổi m</a:t>
-            </a:r>
-            <a:r>
-              <a:rPr lang="en-ZA" sz="2800" smtClean="0">
-                <a:solidFill>
-                  <a:srgbClr val="000000"/>
-                </a:solidFill>
-                <a:latin typeface="Calibri" panose="020F0502020204030204" pitchFamily="34" charset="0"/>
-                <a:cs typeface="Times New Roman" panose="02020603050405020304" pitchFamily="18" charset="0"/>
-              </a:rPr>
-              <a:t>ã</a:t>
-            </a:r>
-            <a:r>
-              <a:rPr lang="en-ZA" sz="2800" smtClean="0">
-                <a:solidFill>
-                  <a:srgbClr val="000000"/>
-                </a:solidFill>
-                <a:latin typeface="Calibri" panose="020F0502020204030204" pitchFamily="34" charset="0"/>
-                <a:cs typeface="Times New Roman" panose="02020603050405020304" pitchFamily="18" charset="0"/>
-              </a:rPr>
-              <a:t>.</a:t>
+              <a:t>ã.</a:t>
             </a:r>
             <a:endParaRPr lang="en-GB" sz="2800" smtClean="0">
               <a:latin typeface="Calibri" panose="020F0502020204030204" pitchFamily="34" charset="0"/>
@@ -43995,7 +44145,7 @@
     </p:spTree>
     <p:extLst>
       <p:ext uri="{BB962C8B-B14F-4D97-AF65-F5344CB8AC3E}">
-        <p14:creationId xmlns:p14="http://schemas.microsoft.com/office/powerpoint/2010/main" xmlns="" val="3991491017"/>
+        <p14:creationId xmlns:p14="http://schemas.microsoft.com/office/powerpoint/2010/main" val="3991491017"/>
       </p:ext>
     </p:extLst>
   </p:cSld>
@@ -44005,6 +44155,13 @@
   <p:transition>
     <p:fade/>
   </p:transition>
+  <p:timing>
+    <p:tnLst>
+      <p:par>
+        <p:cTn id="1" dur="indefinite" restart="never" nodeType="tmRoot"/>
+      </p:par>
+    </p:tnLst>
+  </p:timing>
 </p:sld>
 </file>
 
@@ -44261,7 +44418,7 @@
   <a:extraClrSchemeLst/>
   <a:extLst>
     <a:ext uri="{05A4C25C-085E-4340-85A3-A5531E510DB2}">
-      <thm15:themeFamily xmlns:thm15="http://schemas.microsoft.com/office/thememl/2012/main" xmlns="" name="Office Theme" id="{62F939B6-93AF-4DB8-9C6B-D6C7DFDC589F}" vid="{4A3C46E8-61CC-4603-A589-7422A47A8E4A}"/>
+      <thm15:themeFamily xmlns:thm15="http://schemas.microsoft.com/office/thememl/2012/main" name="Office Theme" id="{62F939B6-93AF-4DB8-9C6B-D6C7DFDC589F}" vid="{4A3C46E8-61CC-4603-A589-7422A47A8E4A}"/>
     </a:ext>
   </a:extLst>
 </a:theme>

</xml_diff>